<commit_message>
Updated Part-1 notebook and ppt
</commit_message>
<xml_diff>
--- a/31052020-virtualmlnet/virtualmlnet-2020.pptx
+++ b/31052020-virtualmlnet/virtualmlnet-2020.pptx
@@ -5,7 +5,7 @@
     <p:sldMasterId id="2147483717" r:id="rId1"/>
   </p:sldMasterIdLst>
   <p:notesMasterIdLst>
-    <p:notesMasterId r:id="rId17"/>
+    <p:notesMasterId r:id="rId19"/>
   </p:notesMasterIdLst>
   <p:sldIdLst>
     <p:sldId id="256" r:id="rId2"/>
@@ -20,9 +20,11 @@
     <p:sldId id="318" r:id="rId11"/>
     <p:sldId id="319" r:id="rId12"/>
     <p:sldId id="320" r:id="rId13"/>
-    <p:sldId id="321" r:id="rId14"/>
-    <p:sldId id="324" r:id="rId15"/>
-    <p:sldId id="325" r:id="rId16"/>
+    <p:sldId id="326" r:id="rId14"/>
+    <p:sldId id="327" r:id="rId15"/>
+    <p:sldId id="321" r:id="rId16"/>
+    <p:sldId id="324" r:id="rId17"/>
+    <p:sldId id="325" r:id="rId18"/>
   </p:sldIdLst>
   <p:sldSz cx="12192000" cy="6858000"/>
   <p:notesSz cx="6858000" cy="9144000"/>
@@ -211,7 +213,7 @@
           <a:p>
             <a:fld id="{154FEC57-6F76-4D9A-BEBF-4431325DB260}" type="datetimeFigureOut">
               <a:rPr lang="en-US" smtClean="0"/>
-              <a:t>5/28/2020</a:t>
+              <a:t>5/30/2020</a:t>
             </a:fld>
             <a:endParaRPr lang="en-US" dirty="0"/>
           </a:p>
@@ -805,7 +807,7 @@
     </p:spTree>
     <p:extLst>
       <p:ext uri="{BB962C8B-B14F-4D97-AF65-F5344CB8AC3E}">
-        <p14:creationId xmlns:p14="http://schemas.microsoft.com/office/powerpoint/2010/main" val="2773224715"/>
+        <p14:creationId xmlns:p14="http://schemas.microsoft.com/office/powerpoint/2010/main" val="382722078"/>
       </p:ext>
     </p:extLst>
   </p:cSld>
@@ -889,7 +891,7 @@
     </p:spTree>
     <p:extLst>
       <p:ext uri="{BB962C8B-B14F-4D97-AF65-F5344CB8AC3E}">
-        <p14:creationId xmlns:p14="http://schemas.microsoft.com/office/powerpoint/2010/main" val="1766728910"/>
+        <p14:creationId xmlns:p14="http://schemas.microsoft.com/office/powerpoint/2010/main" val="3925919008"/>
       </p:ext>
     </p:extLst>
   </p:cSld>
@@ -965,6 +967,174 @@
             <a:fld id="{55849CEA-452E-49F3-92ED-210B64DD3C6C}" type="slidenum">
               <a:rPr lang="en-US" smtClean="0"/>
               <a:t>15</a:t>
+            </a:fld>
+            <a:endParaRPr lang="en-US" dirty="0"/>
+          </a:p>
+        </p:txBody>
+      </p:sp>
+    </p:spTree>
+    <p:extLst>
+      <p:ext uri="{BB962C8B-B14F-4D97-AF65-F5344CB8AC3E}">
+        <p14:creationId xmlns:p14="http://schemas.microsoft.com/office/powerpoint/2010/main" val="2773224715"/>
+      </p:ext>
+    </p:extLst>
+  </p:cSld>
+  <p:clrMapOvr>
+    <a:masterClrMapping/>
+  </p:clrMapOvr>
+</p:notes>
+</file>
+
+<file path=ppt/notesSlides/notesSlide15.xml><?xml version="1.0" encoding="utf-8"?>
+<p:notes xmlns:a="http://schemas.openxmlformats.org/drawingml/2006/main" xmlns:r="http://schemas.openxmlformats.org/officeDocument/2006/relationships" xmlns:p="http://schemas.openxmlformats.org/presentationml/2006/main">
+  <p:cSld>
+    <p:spTree>
+      <p:nvGrpSpPr>
+        <p:cNvPr id="1" name=""/>
+        <p:cNvGrpSpPr/>
+        <p:nvPr/>
+      </p:nvGrpSpPr>
+      <p:grpSpPr>
+        <a:xfrm>
+          <a:off x="0" y="0"/>
+          <a:ext cx="0" cy="0"/>
+          <a:chOff x="0" y="0"/>
+          <a:chExt cx="0" cy="0"/>
+        </a:xfrm>
+      </p:grpSpPr>
+      <p:sp>
+        <p:nvSpPr>
+          <p:cNvPr id="2" name="Slide Image Placeholder 1"/>
+          <p:cNvSpPr>
+            <a:spLocks noGrp="1" noRot="1" noChangeAspect="1"/>
+          </p:cNvSpPr>
+          <p:nvPr>
+            <p:ph type="sldImg"/>
+          </p:nvPr>
+        </p:nvSpPr>
+        <p:spPr/>
+      </p:sp>
+      <p:sp>
+        <p:nvSpPr>
+          <p:cNvPr id="3" name="Notes Placeholder 2"/>
+          <p:cNvSpPr>
+            <a:spLocks noGrp="1"/>
+          </p:cNvSpPr>
+          <p:nvPr>
+            <p:ph type="body" idx="1"/>
+          </p:nvPr>
+        </p:nvSpPr>
+        <p:spPr/>
+        <p:txBody>
+          <a:bodyPr/>
+          <a:lstStyle/>
+          <a:p>
+            <a:endParaRPr lang="en-US" dirty="0"/>
+          </a:p>
+        </p:txBody>
+      </p:sp>
+      <p:sp>
+        <p:nvSpPr>
+          <p:cNvPr id="4" name="Slide Number Placeholder 3"/>
+          <p:cNvSpPr>
+            <a:spLocks noGrp="1"/>
+          </p:cNvSpPr>
+          <p:nvPr>
+            <p:ph type="sldNum" sz="quarter" idx="10"/>
+          </p:nvPr>
+        </p:nvSpPr>
+        <p:spPr/>
+        <p:txBody>
+          <a:bodyPr/>
+          <a:lstStyle/>
+          <a:p>
+            <a:fld id="{55849CEA-452E-49F3-92ED-210B64DD3C6C}" type="slidenum">
+              <a:rPr lang="en-US" smtClean="0"/>
+              <a:t>16</a:t>
+            </a:fld>
+            <a:endParaRPr lang="en-US" dirty="0"/>
+          </a:p>
+        </p:txBody>
+      </p:sp>
+    </p:spTree>
+    <p:extLst>
+      <p:ext uri="{BB962C8B-B14F-4D97-AF65-F5344CB8AC3E}">
+        <p14:creationId xmlns:p14="http://schemas.microsoft.com/office/powerpoint/2010/main" val="1766728910"/>
+      </p:ext>
+    </p:extLst>
+  </p:cSld>
+  <p:clrMapOvr>
+    <a:masterClrMapping/>
+  </p:clrMapOvr>
+</p:notes>
+</file>
+
+<file path=ppt/notesSlides/notesSlide16.xml><?xml version="1.0" encoding="utf-8"?>
+<p:notes xmlns:a="http://schemas.openxmlformats.org/drawingml/2006/main" xmlns:r="http://schemas.openxmlformats.org/officeDocument/2006/relationships" xmlns:p="http://schemas.openxmlformats.org/presentationml/2006/main">
+  <p:cSld>
+    <p:spTree>
+      <p:nvGrpSpPr>
+        <p:cNvPr id="1" name=""/>
+        <p:cNvGrpSpPr/>
+        <p:nvPr/>
+      </p:nvGrpSpPr>
+      <p:grpSpPr>
+        <a:xfrm>
+          <a:off x="0" y="0"/>
+          <a:ext cx="0" cy="0"/>
+          <a:chOff x="0" y="0"/>
+          <a:chExt cx="0" cy="0"/>
+        </a:xfrm>
+      </p:grpSpPr>
+      <p:sp>
+        <p:nvSpPr>
+          <p:cNvPr id="2" name="Slide Image Placeholder 1"/>
+          <p:cNvSpPr>
+            <a:spLocks noGrp="1" noRot="1" noChangeAspect="1"/>
+          </p:cNvSpPr>
+          <p:nvPr>
+            <p:ph type="sldImg"/>
+          </p:nvPr>
+        </p:nvSpPr>
+        <p:spPr/>
+      </p:sp>
+      <p:sp>
+        <p:nvSpPr>
+          <p:cNvPr id="3" name="Notes Placeholder 2"/>
+          <p:cNvSpPr>
+            <a:spLocks noGrp="1"/>
+          </p:cNvSpPr>
+          <p:nvPr>
+            <p:ph type="body" idx="1"/>
+          </p:nvPr>
+        </p:nvSpPr>
+        <p:spPr/>
+        <p:txBody>
+          <a:bodyPr/>
+          <a:lstStyle/>
+          <a:p>
+            <a:endParaRPr lang="en-US" dirty="0"/>
+          </a:p>
+        </p:txBody>
+      </p:sp>
+      <p:sp>
+        <p:nvSpPr>
+          <p:cNvPr id="4" name="Slide Number Placeholder 3"/>
+          <p:cNvSpPr>
+            <a:spLocks noGrp="1"/>
+          </p:cNvSpPr>
+          <p:nvPr>
+            <p:ph type="sldNum" sz="quarter" idx="10"/>
+          </p:nvPr>
+        </p:nvSpPr>
+        <p:spPr/>
+        <p:txBody>
+          <a:bodyPr/>
+          <a:lstStyle/>
+          <a:p>
+            <a:fld id="{55849CEA-452E-49F3-92ED-210B64DD3C6C}" type="slidenum">
+              <a:rPr lang="en-US" smtClean="0"/>
+              <a:t>17</a:t>
             </a:fld>
             <a:endParaRPr lang="en-US" dirty="0"/>
           </a:p>
@@ -1883,7 +2053,7 @@
           <a:p>
             <a:fld id="{48A87A34-81AB-432B-8DAE-1953F412C126}" type="datetimeFigureOut">
               <a:rPr lang="en-US" smtClean="0"/>
-              <a:t>5/28/2020</a:t>
+              <a:t>5/30/2020</a:t>
             </a:fld>
             <a:endParaRPr lang="en-US" dirty="0"/>
           </a:p>
@@ -2091,7 +2261,7 @@
           <a:p>
             <a:fld id="{48A87A34-81AB-432B-8DAE-1953F412C126}" type="datetimeFigureOut">
               <a:rPr lang="en-US" smtClean="0"/>
-              <a:t>5/28/2020</a:t>
+              <a:t>5/30/2020</a:t>
             </a:fld>
             <a:endParaRPr lang="en-US" dirty="0"/>
           </a:p>
@@ -2349,7 +2519,7 @@
           <a:p>
             <a:fld id="{48A87A34-81AB-432B-8DAE-1953F412C126}" type="datetimeFigureOut">
               <a:rPr lang="en-US" smtClean="0"/>
-              <a:t>5/28/2020</a:t>
+              <a:t>5/30/2020</a:t>
             </a:fld>
             <a:endParaRPr lang="en-US" dirty="0"/>
           </a:p>
@@ -2519,7 +2689,7 @@
           <a:p>
             <a:fld id="{48A87A34-81AB-432B-8DAE-1953F412C126}" type="datetimeFigureOut">
               <a:rPr lang="en-US" smtClean="0"/>
-              <a:t>5/28/2020</a:t>
+              <a:t>5/30/2020</a:t>
             </a:fld>
             <a:endParaRPr lang="en-US" dirty="0"/>
           </a:p>
@@ -2856,7 +3026,7 @@
           <a:p>
             <a:fld id="{48A87A34-81AB-432B-8DAE-1953F412C126}" type="datetimeFigureOut">
               <a:rPr lang="en-US" smtClean="0"/>
-              <a:t>5/28/2020</a:t>
+              <a:t>5/30/2020</a:t>
             </a:fld>
             <a:endParaRPr lang="en-US" dirty="0"/>
           </a:p>
@@ -3131,7 +3301,7 @@
           <a:p>
             <a:fld id="{48A87A34-81AB-432B-8DAE-1953F412C126}" type="datetimeFigureOut">
               <a:rPr lang="en-US" smtClean="0"/>
-              <a:t>5/28/2020</a:t>
+              <a:t>5/30/2020</a:t>
             </a:fld>
             <a:endParaRPr lang="en-US" dirty="0"/>
           </a:p>
@@ -3510,7 +3680,7 @@
           <a:p>
             <a:fld id="{48A87A34-81AB-432B-8DAE-1953F412C126}" type="datetimeFigureOut">
               <a:rPr lang="en-US" smtClean="0"/>
-              <a:t>5/28/2020</a:t>
+              <a:t>5/30/2020</a:t>
             </a:fld>
             <a:endParaRPr lang="en-US" dirty="0"/>
           </a:p>
@@ -3628,7 +3798,7 @@
           <a:p>
             <a:fld id="{48A87A34-81AB-432B-8DAE-1953F412C126}" type="datetimeFigureOut">
               <a:rPr lang="en-US" smtClean="0"/>
-              <a:t>5/28/2020</a:t>
+              <a:t>5/30/2020</a:t>
             </a:fld>
             <a:endParaRPr lang="en-US" dirty="0"/>
           </a:p>
@@ -3801,7 +3971,7 @@
           <a:p>
             <a:fld id="{48A87A34-81AB-432B-8DAE-1953F412C126}" type="datetimeFigureOut">
               <a:rPr lang="en-US" smtClean="0"/>
-              <a:t>5/28/2020</a:t>
+              <a:t>5/30/2020</a:t>
             </a:fld>
             <a:endParaRPr lang="en-US" dirty="0"/>
           </a:p>
@@ -4157,7 +4327,7 @@
           <a:p>
             <a:fld id="{48A87A34-81AB-432B-8DAE-1953F412C126}" type="datetimeFigureOut">
               <a:rPr lang="en-US" smtClean="0"/>
-              <a:t>5/28/2020</a:t>
+              <a:t>5/30/2020</a:t>
             </a:fld>
             <a:endParaRPr lang="en-US" dirty="0"/>
           </a:p>
@@ -4536,7 +4706,7 @@
           <a:p>
             <a:fld id="{48A87A34-81AB-432B-8DAE-1953F412C126}" type="datetimeFigureOut">
               <a:rPr lang="en-US" smtClean="0"/>
-              <a:t>5/28/2020</a:t>
+              <a:t>5/30/2020</a:t>
             </a:fld>
             <a:endParaRPr lang="en-US" dirty="0"/>
           </a:p>
@@ -4826,7 +4996,7 @@
             <a:fld id="{48A87A34-81AB-432B-8DAE-1953F412C126}" type="datetimeFigureOut">
               <a:rPr lang="en-US" smtClean="0"/>
               <a:pPr/>
-              <a:t>5/28/2020</a:t>
+              <a:t>5/30/2020</a:t>
             </a:fld>
             <a:endParaRPr lang="en-US" dirty="0"/>
           </a:p>
@@ -5384,11 +5554,7 @@
             <a:pPr algn="ctr"/>
             <a:r>
               <a:rPr lang="en-US" sz="6000" dirty="0" smtClean="0"/>
-              <a:t>COVID-19 Exploratory Data </a:t>
-            </a:r>
-            <a:r>
-              <a:rPr lang="en-US" sz="6000" dirty="0" smtClean="0"/>
-              <a:t>Analysis</a:t>
+              <a:t>COVID-19 Exploratory Data Analysis</a:t>
             </a:r>
             <a:endParaRPr lang="en-US" sz="6000" dirty="0"/>
           </a:p>
@@ -7155,39 +7321,83 @@
       </p:grpSpPr>
       <p:sp>
         <p:nvSpPr>
-          <p:cNvPr id="7" name="TextBox 6"/>
-          <p:cNvSpPr txBox="1"/>
+          <p:cNvPr id="2" name="Title 1"/>
+          <p:cNvSpPr>
+            <a:spLocks noGrp="1"/>
+          </p:cNvSpPr>
+          <p:nvPr>
+            <p:ph type="title"/>
+          </p:nvPr>
+        </p:nvSpPr>
+        <p:spPr/>
+        <p:txBody>
+          <a:bodyPr/>
+          <a:lstStyle/>
+          <a:p>
+            <a:r>
+              <a:rPr lang="en-US" dirty="0" err="1" smtClean="0"/>
+              <a:t>Dataframe</a:t>
+            </a:r>
+            <a:r>
+              <a:rPr lang="en-US" dirty="0" smtClean="0"/>
+              <a:t> </a:t>
+            </a:r>
+            <a:endParaRPr lang="en-US" dirty="0"/>
+          </a:p>
+        </p:txBody>
+      </p:sp>
+      <p:pic>
+        <p:nvPicPr>
+          <p:cNvPr id="4" name="Picture 3"/>
+          <p:cNvPicPr>
+            <a:picLocks noChangeAspect="1"/>
+          </p:cNvPicPr>
           <p:nvPr/>
-        </p:nvSpPr>
+        </p:nvPicPr>
+        <p:blipFill>
+          <a:blip r:embed="rId3"/>
+          <a:stretch>
+            <a:fillRect/>
+          </a:stretch>
+        </p:blipFill>
         <p:spPr>
           <a:xfrm>
-            <a:off x="2421747" y="2855822"/>
-            <a:ext cx="6574870" cy="830997"/>
+            <a:off x="1097280" y="1882062"/>
+            <a:ext cx="3814354" cy="3221449"/>
           </a:xfrm>
           <a:prstGeom prst="rect">
             <a:avLst/>
           </a:prstGeom>
-          <a:noFill/>
         </p:spPr>
-        <p:txBody>
-          <a:bodyPr wrap="square" rtlCol="0">
-            <a:spAutoFit/>
-          </a:bodyPr>
-          <a:lstStyle/>
-          <a:p>
-            <a:pPr algn="ctr"/>
-            <a:r>
-              <a:rPr lang="en-US" sz="4800" b="1" dirty="0" smtClean="0"/>
-              <a:t>Demo</a:t>
-            </a:r>
-            <a:endParaRPr lang="en-US" sz="4800" b="1" dirty="0"/>
-          </a:p>
-        </p:txBody>
-      </p:sp>
+      </p:pic>
+      <p:pic>
+        <p:nvPicPr>
+          <p:cNvPr id="5" name="Picture 4"/>
+          <p:cNvPicPr>
+            <a:picLocks noChangeAspect="1"/>
+          </p:cNvPicPr>
+          <p:nvPr/>
+        </p:nvPicPr>
+        <p:blipFill>
+          <a:blip r:embed="rId4"/>
+          <a:stretch>
+            <a:fillRect/>
+          </a:stretch>
+        </p:blipFill>
+        <p:spPr>
+          <a:xfrm>
+            <a:off x="5223163" y="1882063"/>
+            <a:ext cx="5974598" cy="3223539"/>
+          </a:xfrm>
+          <a:prstGeom prst="rect">
+            <a:avLst/>
+          </a:prstGeom>
+        </p:spPr>
+      </p:pic>
     </p:spTree>
     <p:extLst>
       <p:ext uri="{BB962C8B-B14F-4D97-AF65-F5344CB8AC3E}">
-        <p14:creationId xmlns:p14="http://schemas.microsoft.com/office/powerpoint/2010/main" val="427025909"/>
+        <p14:creationId xmlns:p14="http://schemas.microsoft.com/office/powerpoint/2010/main" val="3891121626"/>
       </p:ext>
     </p:extLst>
   </p:cSld>
@@ -7237,8 +7447,12 @@
           <a:lstStyle/>
           <a:p>
             <a:r>
+              <a:rPr lang="en-US" dirty="0" err="1" smtClean="0"/>
+              <a:t>ML.Net</a:t>
+            </a:r>
+            <a:r>
               <a:rPr lang="en-US" dirty="0" smtClean="0"/>
-              <a:t>References</a:t>
+              <a:t> – Prediction(7 Days) </a:t>
             </a:r>
             <a:endParaRPr lang="en-US" dirty="0"/>
           </a:p>
@@ -7246,223 +7460,117 @@
       </p:sp>
       <p:sp>
         <p:nvSpPr>
-          <p:cNvPr id="3" name="Content Placeholder 2"/>
-          <p:cNvSpPr>
-            <a:spLocks noGrp="1"/>
-          </p:cNvSpPr>
-          <p:nvPr>
-            <p:ph idx="1"/>
-          </p:nvPr>
+          <p:cNvPr id="6" name="Rectangle 5"/>
+          <p:cNvSpPr/>
+          <p:nvPr/>
         </p:nvSpPr>
         <p:spPr>
           <a:xfrm>
-            <a:off x="1097280" y="1737360"/>
-            <a:ext cx="11094719" cy="4674326"/>
+            <a:off x="959427" y="6389362"/>
+            <a:ext cx="8527473" cy="369332"/>
           </a:xfrm>
+          <a:prstGeom prst="rect">
+            <a:avLst/>
+          </a:prstGeom>
         </p:spPr>
         <p:txBody>
-          <a:bodyPr>
-            <a:normAutofit fontScale="25000" lnSpcReduction="20000"/>
+          <a:bodyPr wrap="square">
+            <a:spAutoFit/>
           </a:bodyPr>
           <a:lstStyle/>
           <a:p>
-            <a:pPr lvl="1" fontAlgn="base">
-              <a:lnSpc>
-                <a:spcPct val="120000"/>
-              </a:lnSpc>
-              <a:buFont typeface="Arial" panose="020B0604020202020204" pitchFamily="34" charset="0"/>
-              <a:buChar char="•"/>
-            </a:pPr>
-            <a:r>
-              <a:rPr lang="en-US" sz="8000" dirty="0"/>
-              <a:t>ML.Net : </a:t>
-            </a:r>
-            <a:r>
-              <a:rPr lang="en-US" sz="8000" dirty="0">
+            <a:r>
+              <a:rPr lang="en-US" dirty="0" smtClean="0">
                 <a:hlinkClick r:id="rId3"/>
               </a:rPr>
-              <a:t>https://dotnet.microsoft.com/apps/machinelearning-ai/ml-dotnet</a:t>
-            </a:r>
-            <a:endParaRPr lang="en-US" sz="8000" dirty="0"/>
-          </a:p>
-          <a:p>
-            <a:pPr lvl="1" fontAlgn="base">
-              <a:lnSpc>
-                <a:spcPct val="120000"/>
-              </a:lnSpc>
-              <a:buFont typeface="Arial" panose="020B0604020202020204" pitchFamily="34" charset="0"/>
-              <a:buChar char="•"/>
-            </a:pPr>
-            <a:r>
-              <a:rPr lang="en-US" sz="8000" dirty="0"/>
-              <a:t>ML.Net:  </a:t>
-            </a:r>
-            <a:r>
-              <a:rPr lang="en-US" sz="8000" dirty="0">
-                <a:hlinkClick r:id="rId4"/>
+              <a:t>Source: https</a:t>
+            </a:r>
+            <a:r>
+              <a:rPr lang="en-US" dirty="0">
+                <a:hlinkClick r:id="rId3"/>
               </a:rPr>
-              <a:t>https://devblogs.microsoft.com/cesardelatorre/what-is-ml-net-1-0-machine-learning-for-net/</a:t>
-            </a:r>
-            <a:endParaRPr lang="en-US" sz="8000" dirty="0"/>
-          </a:p>
-          <a:p>
-            <a:pPr lvl="1" fontAlgn="base">
-              <a:lnSpc>
-                <a:spcPct val="120000"/>
-              </a:lnSpc>
-              <a:buFont typeface="Arial" panose="020B0604020202020204" pitchFamily="34" charset="0"/>
-              <a:buChar char="•"/>
-            </a:pPr>
-            <a:r>
-              <a:rPr lang="en-US" sz="8000" dirty="0"/>
-              <a:t>ONNX : </a:t>
-            </a:r>
-            <a:r>
-              <a:rPr lang="en-US" sz="8000" dirty="0">
-                <a:hlinkClick r:id="rId5"/>
-              </a:rPr>
-              <a:t>https://onnx.ai/</a:t>
-            </a:r>
-            <a:endParaRPr lang="en-US" sz="8000" dirty="0"/>
-          </a:p>
-          <a:p>
-            <a:pPr lvl="1" fontAlgn="base">
-              <a:lnSpc>
-                <a:spcPct val="120000"/>
-              </a:lnSpc>
-              <a:buFont typeface="Arial" panose="020B0604020202020204" pitchFamily="34" charset="0"/>
-              <a:buChar char="•"/>
-            </a:pPr>
-            <a:r>
-              <a:rPr lang="en-US" sz="8000" dirty="0"/>
-              <a:t>Photo-Search (ONNX) : </a:t>
-            </a:r>
-            <a:r>
-              <a:rPr lang="en-US" sz="8000" dirty="0">
-                <a:hlinkClick r:id="rId6"/>
-              </a:rPr>
-              <a:t>https://github.com/Tak-Au/Photo-Search</a:t>
-            </a:r>
-            <a:endParaRPr lang="en-US" sz="8000" dirty="0"/>
-          </a:p>
-          <a:p>
-            <a:pPr lvl="1" fontAlgn="base">
-              <a:lnSpc>
-                <a:spcPct val="120000"/>
-              </a:lnSpc>
-              <a:buFont typeface="Arial" panose="020B0604020202020204" pitchFamily="34" charset="0"/>
-              <a:buChar char="•"/>
-            </a:pPr>
-            <a:r>
-              <a:rPr lang="en-US" sz="8000" dirty="0"/>
-              <a:t>Music Repair : </a:t>
-            </a:r>
-            <a:r>
-              <a:rPr lang="en-US" sz="8000" dirty="0">
-                <a:hlinkClick r:id="rId7"/>
-              </a:rPr>
-              <a:t>https://www.youtube.com/watch?v=nnV-1q-z9uE</a:t>
-            </a:r>
-            <a:endParaRPr lang="en-US" sz="8000" dirty="0"/>
-          </a:p>
-          <a:p>
-            <a:pPr lvl="1" fontAlgn="base">
-              <a:lnSpc>
-                <a:spcPct val="120000"/>
-              </a:lnSpc>
-              <a:buFont typeface="Arial" panose="020B0604020202020204" pitchFamily="34" charset="0"/>
-              <a:buChar char="•"/>
-            </a:pPr>
-            <a:r>
-              <a:rPr lang="en-US" sz="8000" dirty="0"/>
-              <a:t>ML Cookbook : </a:t>
-            </a:r>
-            <a:r>
-              <a:rPr lang="en-US" sz="8000" dirty="0">
-                <a:hlinkClick r:id="rId8"/>
-              </a:rPr>
-              <a:t>https://github.com/dotnet/machinelearning/blob/master/docs/code/MlNetCookBook.md</a:t>
-            </a:r>
-            <a:endParaRPr lang="en-US" sz="8000" dirty="0"/>
-          </a:p>
-          <a:p>
-            <a:pPr lvl="1" fontAlgn="base">
-              <a:lnSpc>
-                <a:spcPct val="120000"/>
-              </a:lnSpc>
-              <a:buFont typeface="Arial" panose="020B0604020202020204" pitchFamily="34" charset="0"/>
-              <a:buChar char="•"/>
-            </a:pPr>
-            <a:r>
-              <a:rPr lang="en-US" sz="8000" dirty="0"/>
-              <a:t>Deploy to Azure functions : </a:t>
-            </a:r>
-            <a:r>
-              <a:rPr lang="en-US" sz="8000" dirty="0">
-                <a:hlinkClick r:id="rId9"/>
-              </a:rPr>
-              <a:t>http://luisquintanilla.me/2018/08/21/serverless-machine-learning-mlnet-azure-functions/</a:t>
-            </a:r>
-            <a:endParaRPr lang="en-US" sz="8000" dirty="0"/>
-          </a:p>
-          <a:p>
-            <a:pPr lvl="1" fontAlgn="base">
-              <a:lnSpc>
-                <a:spcPct val="120000"/>
-              </a:lnSpc>
-              <a:buFont typeface="Arial" panose="020B0604020202020204" pitchFamily="34" charset="0"/>
-              <a:buChar char="•"/>
-            </a:pPr>
-            <a:r>
-              <a:rPr lang="en-US" sz="8000" dirty="0">
-                <a:hlinkClick r:id="rId10"/>
-              </a:rPr>
-              <a:t>https://rubikscode.net/2019/02/18/ultimate-guide-to-machine-learning-with-ml-net/</a:t>
-            </a:r>
-            <a:endParaRPr lang="en-US" sz="8000" dirty="0"/>
-          </a:p>
-          <a:p>
-            <a:pPr lvl="1" fontAlgn="base">
-              <a:lnSpc>
-                <a:spcPct val="120000"/>
-              </a:lnSpc>
-              <a:buFont typeface="Arial" panose="020B0604020202020204" pitchFamily="34" charset="0"/>
-              <a:buChar char="•"/>
-            </a:pPr>
-            <a:r>
-              <a:rPr lang="en-US" sz="8000" dirty="0">
-                <a:hlinkClick r:id="rId11"/>
-              </a:rPr>
-              <a:t>https://www.youtube.com/watch?v=dojO4zEL9sg</a:t>
-            </a:r>
-            <a:endParaRPr lang="en-US" sz="8000" dirty="0"/>
-          </a:p>
-          <a:p>
-            <a:pPr lvl="1" fontAlgn="base">
-              <a:lnSpc>
-                <a:spcPct val="120000"/>
-              </a:lnSpc>
-              <a:buFont typeface="Arial" panose="020B0604020202020204" pitchFamily="34" charset="0"/>
-              <a:buChar char="•"/>
-            </a:pPr>
-            <a:r>
-              <a:rPr lang="en-US" sz="8000" dirty="0">
-                <a:hlinkClick r:id="rId12"/>
-              </a:rPr>
-              <a:t>https://www.youtube.com/watch?v=zy7Y9CHji2k</a:t>
-            </a:r>
-            <a:endParaRPr lang="en-US" sz="8000" dirty="0"/>
-          </a:p>
-          <a:p>
-            <a:pPr fontAlgn="base"/>
+              <a:t>://slides.ourworldindata.org/2020_pandemic/2020_pandemic#/title-slide</a:t>
+            </a:r>
             <a:endParaRPr lang="en-US" dirty="0"/>
           </a:p>
         </p:txBody>
       </p:sp>
+      <p:pic>
+        <p:nvPicPr>
+          <p:cNvPr id="3" name="Picture 2"/>
+          <p:cNvPicPr>
+            <a:picLocks noChangeAspect="1"/>
+          </p:cNvPicPr>
+          <p:nvPr/>
+        </p:nvPicPr>
+        <p:blipFill>
+          <a:blip r:embed="rId4"/>
+          <a:stretch>
+            <a:fillRect/>
+          </a:stretch>
+        </p:blipFill>
+        <p:spPr>
+          <a:xfrm>
+            <a:off x="1097280" y="1897211"/>
+            <a:ext cx="4276600" cy="3153762"/>
+          </a:xfrm>
+          <a:prstGeom prst="rect">
+            <a:avLst/>
+          </a:prstGeom>
+        </p:spPr>
+      </p:pic>
+      <p:pic>
+        <p:nvPicPr>
+          <p:cNvPr id="7" name="Picture 6"/>
+          <p:cNvPicPr>
+            <a:picLocks noChangeAspect="1"/>
+          </p:cNvPicPr>
+          <p:nvPr/>
+        </p:nvPicPr>
+        <p:blipFill>
+          <a:blip r:embed="rId5"/>
+          <a:stretch>
+            <a:fillRect/>
+          </a:stretch>
+        </p:blipFill>
+        <p:spPr>
+          <a:xfrm>
+            <a:off x="5480180" y="1897211"/>
+            <a:ext cx="4284471" cy="3153762"/>
+          </a:xfrm>
+          <a:prstGeom prst="rect">
+            <a:avLst/>
+          </a:prstGeom>
+        </p:spPr>
+      </p:pic>
+      <p:pic>
+        <p:nvPicPr>
+          <p:cNvPr id="8" name="Picture 7"/>
+          <p:cNvPicPr>
+            <a:picLocks noChangeAspect="1"/>
+          </p:cNvPicPr>
+          <p:nvPr/>
+        </p:nvPicPr>
+        <p:blipFill>
+          <a:blip r:embed="rId6"/>
+          <a:stretch>
+            <a:fillRect/>
+          </a:stretch>
+        </p:blipFill>
+        <p:spPr>
+          <a:xfrm>
+            <a:off x="9870951" y="1897210"/>
+            <a:ext cx="1781118" cy="3162129"/>
+          </a:xfrm>
+          <a:prstGeom prst="rect">
+            <a:avLst/>
+          </a:prstGeom>
+        </p:spPr>
+      </p:pic>
     </p:spTree>
     <p:extLst>
       <p:ext uri="{BB962C8B-B14F-4D97-AF65-F5344CB8AC3E}">
-        <p14:creationId xmlns:p14="http://schemas.microsoft.com/office/powerpoint/2010/main" val="1550265034"/>
+        <p14:creationId xmlns:p14="http://schemas.microsoft.com/office/powerpoint/2010/main" val="398535371"/>
       </p:ext>
     </p:extLst>
   </p:cSld>
@@ -7498,6 +7606,200 @@
       </p:grpSpPr>
       <p:sp>
         <p:nvSpPr>
+          <p:cNvPr id="7" name="TextBox 6"/>
+          <p:cNvSpPr txBox="1"/>
+          <p:nvPr/>
+        </p:nvSpPr>
+        <p:spPr>
+          <a:xfrm>
+            <a:off x="2421747" y="2855822"/>
+            <a:ext cx="6574870" cy="830997"/>
+          </a:xfrm>
+          <a:prstGeom prst="rect">
+            <a:avLst/>
+          </a:prstGeom>
+          <a:noFill/>
+        </p:spPr>
+        <p:txBody>
+          <a:bodyPr wrap="square" rtlCol="0">
+            <a:spAutoFit/>
+          </a:bodyPr>
+          <a:lstStyle/>
+          <a:p>
+            <a:pPr algn="ctr"/>
+            <a:r>
+              <a:rPr lang="en-US" sz="4800" b="1" dirty="0" smtClean="0"/>
+              <a:t>Demo</a:t>
+            </a:r>
+            <a:endParaRPr lang="en-US" sz="4800" b="1" dirty="0"/>
+          </a:p>
+        </p:txBody>
+      </p:sp>
+    </p:spTree>
+    <p:extLst>
+      <p:ext uri="{BB962C8B-B14F-4D97-AF65-F5344CB8AC3E}">
+        <p14:creationId xmlns:p14="http://schemas.microsoft.com/office/powerpoint/2010/main" val="427025909"/>
+      </p:ext>
+    </p:extLst>
+  </p:cSld>
+  <p:clrMapOvr>
+    <a:masterClrMapping/>
+  </p:clrMapOvr>
+  <p:timing>
+    <p:tnLst>
+      <p:par>
+        <p:cTn id="1" dur="indefinite" restart="never" nodeType="tmRoot"/>
+      </p:par>
+    </p:tnLst>
+  </p:timing>
+</p:sld>
+</file>
+
+<file path=ppt/slides/slide16.xml><?xml version="1.0" encoding="utf-8"?>
+<p:sld xmlns:a="http://schemas.openxmlformats.org/drawingml/2006/main" xmlns:r="http://schemas.openxmlformats.org/officeDocument/2006/relationships" xmlns:p="http://schemas.openxmlformats.org/presentationml/2006/main">
+  <p:cSld>
+    <p:spTree>
+      <p:nvGrpSpPr>
+        <p:cNvPr id="1" name=""/>
+        <p:cNvGrpSpPr/>
+        <p:nvPr/>
+      </p:nvGrpSpPr>
+      <p:grpSpPr>
+        <a:xfrm>
+          <a:off x="0" y="0"/>
+          <a:ext cx="0" cy="0"/>
+          <a:chOff x="0" y="0"/>
+          <a:chExt cx="0" cy="0"/>
+        </a:xfrm>
+      </p:grpSpPr>
+      <p:sp>
+        <p:nvSpPr>
+          <p:cNvPr id="2" name="Title 1"/>
+          <p:cNvSpPr>
+            <a:spLocks noGrp="1"/>
+          </p:cNvSpPr>
+          <p:nvPr>
+            <p:ph type="title"/>
+          </p:nvPr>
+        </p:nvSpPr>
+        <p:spPr/>
+        <p:txBody>
+          <a:bodyPr/>
+          <a:lstStyle/>
+          <a:p>
+            <a:r>
+              <a:rPr lang="en-US" dirty="0" smtClean="0"/>
+              <a:t>References</a:t>
+            </a:r>
+            <a:endParaRPr lang="en-US" dirty="0"/>
+          </a:p>
+        </p:txBody>
+      </p:sp>
+      <p:sp>
+        <p:nvSpPr>
+          <p:cNvPr id="3" name="Content Placeholder 2"/>
+          <p:cNvSpPr>
+            <a:spLocks noGrp="1"/>
+          </p:cNvSpPr>
+          <p:nvPr>
+            <p:ph idx="1"/>
+          </p:nvPr>
+        </p:nvSpPr>
+        <p:spPr>
+          <a:xfrm>
+            <a:off x="1097280" y="2133600"/>
+            <a:ext cx="9579430" cy="2177142"/>
+          </a:xfrm>
+        </p:spPr>
+        <p:txBody>
+          <a:bodyPr>
+            <a:normAutofit lnSpcReduction="10000"/>
+          </a:bodyPr>
+          <a:lstStyle/>
+          <a:p>
+            <a:pPr marL="201168" lvl="1" indent="0" fontAlgn="base">
+              <a:lnSpc>
+                <a:spcPct val="120000"/>
+              </a:lnSpc>
+              <a:buNone/>
+            </a:pPr>
+            <a:endParaRPr lang="en-US" sz="2800" dirty="0">
+              <a:hlinkClick r:id="rId3"/>
+            </a:endParaRPr>
+          </a:p>
+          <a:p>
+            <a:pPr marL="201168" lvl="1" indent="0" fontAlgn="base">
+              <a:lnSpc>
+                <a:spcPct val="120000"/>
+              </a:lnSpc>
+              <a:buNone/>
+            </a:pPr>
+            <a:endParaRPr lang="en-US" sz="2800" dirty="0" smtClean="0">
+              <a:hlinkClick r:id="rId3"/>
+            </a:endParaRPr>
+          </a:p>
+          <a:p>
+            <a:pPr marL="201168" lvl="1" indent="0" fontAlgn="base">
+              <a:lnSpc>
+                <a:spcPct val="120000"/>
+              </a:lnSpc>
+              <a:buNone/>
+            </a:pPr>
+            <a:r>
+              <a:rPr lang="en-US" sz="2800" dirty="0" smtClean="0">
+                <a:hlinkClick r:id="rId3"/>
+              </a:rPr>
+              <a:t>https</a:t>
+            </a:r>
+            <a:r>
+              <a:rPr lang="en-US" sz="2800" dirty="0">
+                <a:hlinkClick r:id="rId3"/>
+              </a:rPr>
+              <a:t>://github.com/praveenraghuvanshi1512/TechnicalSessions/tree/31052020-virtualmlnet/31052020-virtualmlnet</a:t>
+            </a:r>
+            <a:endParaRPr lang="en-US" sz="2800" dirty="0"/>
+          </a:p>
+        </p:txBody>
+      </p:sp>
+    </p:spTree>
+    <p:extLst>
+      <p:ext uri="{BB962C8B-B14F-4D97-AF65-F5344CB8AC3E}">
+        <p14:creationId xmlns:p14="http://schemas.microsoft.com/office/powerpoint/2010/main" val="1550265034"/>
+      </p:ext>
+    </p:extLst>
+  </p:cSld>
+  <p:clrMapOvr>
+    <a:masterClrMapping/>
+  </p:clrMapOvr>
+  <p:timing>
+    <p:tnLst>
+      <p:par>
+        <p:cTn id="1" dur="indefinite" restart="never" nodeType="tmRoot"/>
+      </p:par>
+    </p:tnLst>
+  </p:timing>
+</p:sld>
+</file>
+
+<file path=ppt/slides/slide17.xml><?xml version="1.0" encoding="utf-8"?>
+<p:sld xmlns:a="http://schemas.openxmlformats.org/drawingml/2006/main" xmlns:r="http://schemas.openxmlformats.org/officeDocument/2006/relationships" xmlns:p="http://schemas.openxmlformats.org/presentationml/2006/main">
+  <p:cSld>
+    <p:spTree>
+      <p:nvGrpSpPr>
+        <p:cNvPr id="1" name=""/>
+        <p:cNvGrpSpPr/>
+        <p:nvPr/>
+      </p:nvGrpSpPr>
+      <p:grpSpPr>
+        <a:xfrm>
+          <a:off x="0" y="0"/>
+          <a:ext cx="0" cy="0"/>
+          <a:chOff x="0" y="0"/>
+          <a:chExt cx="0" cy="0"/>
+        </a:xfrm>
+      </p:grpSpPr>
+      <p:sp>
+        <p:nvSpPr>
           <p:cNvPr id="2" name="Title 1"/>
           <p:cNvSpPr>
             <a:spLocks noGrp="1"/>
@@ -7573,7 +7875,7 @@
               <a:buNone/>
             </a:pPr>
             <a:r>
-              <a:rPr lang="en-US" sz="8000" dirty="0"/>
+              <a:rPr lang="en-US" sz="8000" dirty="0" smtClean="0"/>
               <a:t>praveenraghuvanshi@gmail.com</a:t>
             </a:r>
           </a:p>
@@ -7585,10 +7887,16 @@
               <a:buNone/>
             </a:pPr>
             <a:r>
+              <a:rPr lang="en-US" sz="8000" dirty="0" smtClean="0">
+                <a:hlinkClick r:id="rId3"/>
+              </a:rPr>
+              <a:t>https</a:t>
+            </a:r>
+            <a:r>
               <a:rPr lang="en-US" sz="8000" dirty="0">
                 <a:hlinkClick r:id="rId3"/>
               </a:rPr>
-              <a:t>https://</a:t>
+              <a:t>://</a:t>
             </a:r>
             <a:r>
               <a:rPr lang="en-US" sz="8000" dirty="0" smtClean="0">
@@ -8330,14 +8638,20 @@
               <a:buChar char="•"/>
             </a:pPr>
             <a:r>
+              <a:rPr lang="en-US" sz="3200" dirty="0" smtClean="0"/>
+              <a:t>Dataset -</a:t>
+            </a:r>
+            <a:r>
+              <a:rPr lang="en-US" sz="3200" dirty="0">
+                <a:hlinkClick r:id="rId3"/>
+              </a:rPr>
+              <a:t> John Hopkins University </a:t>
+            </a:r>
+            <a:r>
               <a:rPr lang="en-US" sz="3200" dirty="0" smtClean="0">
                 <a:hlinkClick r:id="rId3"/>
               </a:rPr>
-              <a:t>John Hopkins University CSSE</a:t>
-            </a:r>
-            <a:r>
-              <a:rPr lang="en-US" sz="3200" dirty="0" smtClean="0"/>
-              <a:t>- Dataset</a:t>
+              <a:t>CSSE</a:t>
             </a:r>
             <a:endParaRPr lang="en-US" sz="3200" dirty="0"/>
           </a:p>
@@ -8350,20 +8664,24 @@
               <a:buChar char="•"/>
             </a:pPr>
             <a:r>
-              <a:rPr lang="en-US" sz="3200" dirty="0">
+              <a:rPr lang="en-US" sz="3200" dirty="0"/>
+              <a:t>Python Visualization </a:t>
+            </a:r>
+            <a:r>
+              <a:rPr lang="en-US" sz="3200" dirty="0" smtClean="0"/>
+              <a:t>- </a:t>
+            </a:r>
+            <a:r>
+              <a:rPr lang="en-US" sz="3200" dirty="0" err="1" smtClean="0">
                 <a:hlinkClick r:id="rId4"/>
               </a:rPr>
-              <a:t>Akshay </a:t>
+              <a:t>Akshay</a:t>
             </a:r>
             <a:r>
               <a:rPr lang="en-US" sz="3200" dirty="0" smtClean="0">
                 <a:hlinkClick r:id="rId4"/>
               </a:rPr>
-              <a:t>Sb</a:t>
-            </a:r>
-            <a:r>
-              <a:rPr lang="en-US" sz="3200" dirty="0" smtClean="0"/>
-              <a:t> – Python Visualization</a:t>
+              <a:t> Sb</a:t>
             </a:r>
             <a:endParaRPr lang="en-US" sz="3200" dirty="0"/>
           </a:p>
@@ -8377,8 +8695,17 @@
             </a:pPr>
             <a:r>
               <a:rPr lang="en-US" sz="3200" dirty="0" smtClean="0"/>
-              <a:t>Alexander and Jon – Organizers </a:t>
-            </a:r>
+              <a:t>Organizers - Alexander </a:t>
+            </a:r>
+            <a:r>
+              <a:rPr lang="en-US" sz="3200" dirty="0" smtClean="0"/>
+              <a:t>and </a:t>
+            </a:r>
+            <a:r>
+              <a:rPr lang="en-US" sz="3200" dirty="0" smtClean="0"/>
+              <a:t>Jon</a:t>
+            </a:r>
+            <a:endParaRPr lang="en-US" sz="3200" dirty="0" smtClean="0"/>
           </a:p>
           <a:p>
             <a:pPr lvl="1" fontAlgn="base">
@@ -8389,20 +8716,28 @@
               <a:buChar char="•"/>
             </a:pPr>
             <a:r>
+              <a:rPr lang="en-US" sz="3200" dirty="0"/>
+              <a:t>Sponsors </a:t>
+            </a:r>
+            <a:r>
+              <a:rPr lang="en-US" sz="3200" dirty="0" smtClean="0"/>
+              <a:t>- </a:t>
+            </a:r>
+            <a:r>
               <a:rPr lang="en-US" sz="3200" dirty="0" err="1" smtClean="0"/>
               <a:t>Excella</a:t>
             </a:r>
             <a:r>
               <a:rPr lang="en-US" sz="3200" dirty="0" smtClean="0"/>
-              <a:t> and </a:t>
+              <a:t> </a:t>
+            </a:r>
+            <a:r>
+              <a:rPr lang="en-US" sz="3200" dirty="0" smtClean="0"/>
+              <a:t>and </a:t>
             </a:r>
             <a:r>
               <a:rPr lang="en-US" sz="3200" dirty="0" err="1" smtClean="0"/>
               <a:t>Wintellect</a:t>
-            </a:r>
-            <a:r>
-              <a:rPr lang="en-US" sz="3200" dirty="0" smtClean="0"/>
-              <a:t> - Sponsors</a:t>
             </a:r>
             <a:endParaRPr lang="en-US" sz="3200" dirty="0"/>
           </a:p>
@@ -9242,7 +9577,15 @@
           <a:p>
             <a:r>
               <a:rPr lang="en-US" dirty="0" smtClean="0"/>
-              <a:t>COVID-19 (Statistics) : May 26, 2020</a:t>
+              <a:t>COVID-19 (Statistics) : May </a:t>
+            </a:r>
+            <a:r>
+              <a:rPr lang="en-US" dirty="0" smtClean="0"/>
+              <a:t>27, </a:t>
+            </a:r>
+            <a:r>
+              <a:rPr lang="en-US" dirty="0" smtClean="0"/>
+              <a:t>2020</a:t>
             </a:r>
             <a:endParaRPr lang="en-US" dirty="0"/>
           </a:p>
@@ -9272,7 +9615,7 @@
         </p:blipFill>
         <p:spPr>
           <a:xfrm>
-            <a:off x="322221" y="1929137"/>
+            <a:off x="330930" y="1929137"/>
             <a:ext cx="5693326" cy="4018818"/>
           </a:xfrm>
         </p:spPr>
@@ -10352,7 +10695,12 @@
             <p:ph type="title"/>
           </p:nvPr>
         </p:nvSpPr>
-        <p:spPr/>
+        <p:spPr>
+          <a:xfrm>
+            <a:off x="1097280" y="286603"/>
+            <a:ext cx="5390606" cy="1450757"/>
+          </a:xfrm>
+        </p:spPr>
         <p:txBody>
           <a:bodyPr/>
           <a:lstStyle/>
@@ -10389,42 +10737,68 @@
           <a:p>
             <a:pPr lvl="1" fontAlgn="base">
               <a:lnSpc>
-                <a:spcPct val="150000"/>
+                <a:spcPct val="130000"/>
               </a:lnSpc>
+              <a:buFont typeface="Arial" panose="020B0604020202020204" pitchFamily="34" charset="0"/>
+              <a:buChar char="•"/>
             </a:pPr>
             <a:r>
               <a:rPr lang="en-US" sz="3200" dirty="0" smtClean="0"/>
-              <a:t> The </a:t>
-            </a:r>
-            <a:r>
-              <a:rPr lang="en-US" sz="3200" dirty="0"/>
-              <a:t>analysis of data organized across units of time</a:t>
-            </a:r>
-            <a:r>
-              <a:rPr lang="en-US" sz="3200" dirty="0" smtClean="0"/>
+              <a:t> </a:t>
+            </a:r>
+            <a:r>
+              <a:rPr lang="en-US" sz="3000" dirty="0"/>
+              <a:t>The </a:t>
+            </a:r>
+            <a:r>
+              <a:rPr lang="en-US" sz="3000" dirty="0"/>
+              <a:t>analysis of data organized </a:t>
+            </a:r>
+            <a:r>
+              <a:rPr lang="en-US" sz="3000" dirty="0" smtClean="0"/>
+              <a:t> across </a:t>
+            </a:r>
+            <a:r>
+              <a:rPr lang="en-US" sz="3000" dirty="0"/>
+              <a:t>units of time</a:t>
+            </a:r>
+            <a:r>
+              <a:rPr lang="en-US" sz="3000" dirty="0"/>
               <a:t>.</a:t>
             </a:r>
           </a:p>
           <a:p>
             <a:pPr lvl="1" fontAlgn="base">
               <a:lnSpc>
-                <a:spcPct val="150000"/>
+                <a:spcPct val="130000"/>
               </a:lnSpc>
+              <a:buFont typeface="Arial" panose="020B0604020202020204" pitchFamily="34" charset="0"/>
+              <a:buChar char="•"/>
             </a:pPr>
             <a:r>
-              <a:rPr lang="en-US" sz="3200" dirty="0" smtClean="0"/>
-              <a:t>It helps understand past trends and plan for future</a:t>
+              <a:rPr lang="en-US" sz="3000" dirty="0" smtClean="0"/>
+              <a:t> It </a:t>
+            </a:r>
+            <a:r>
+              <a:rPr lang="en-US" sz="3000" dirty="0"/>
+              <a:t>helps understand past trends and plan for future</a:t>
             </a:r>
           </a:p>
           <a:p>
             <a:pPr lvl="1" fontAlgn="base">
               <a:lnSpc>
-                <a:spcPct val="150000"/>
+                <a:spcPct val="130000"/>
               </a:lnSpc>
+              <a:buFont typeface="Arial" panose="020B0604020202020204" pitchFamily="34" charset="0"/>
+              <a:buChar char="•"/>
             </a:pPr>
             <a:r>
-              <a:rPr lang="en-US" sz="3200" dirty="0" smtClean="0"/>
-              <a:t>Types: Trends, Seasonality, Irregularity, Cyclic</a:t>
+              <a:rPr lang="en-US" sz="3000" dirty="0" smtClean="0"/>
+              <a:t> Types</a:t>
+            </a:r>
+            <a:r>
+              <a:rPr lang="en-US" sz="3000" dirty="0"/>
+              <a:t>: Trends, Seasonality, Irregularity, Cyclic</a:t>
             </a:r>
           </a:p>
           <a:p>

</xml_diff>

<commit_message>
Updated reference to master
</commit_message>
<xml_diff>
--- a/31052020-virtualmlnet/virtualmlnet-2020.pptx
+++ b/31052020-virtualmlnet/virtualmlnet-2020.pptx
@@ -7458,43 +7458,6 @@
           </a:p>
         </p:txBody>
       </p:sp>
-      <p:sp>
-        <p:nvSpPr>
-          <p:cNvPr id="6" name="Rectangle 5"/>
-          <p:cNvSpPr/>
-          <p:nvPr/>
-        </p:nvSpPr>
-        <p:spPr>
-          <a:xfrm>
-            <a:off x="959427" y="6389362"/>
-            <a:ext cx="8527473" cy="369332"/>
-          </a:xfrm>
-          <a:prstGeom prst="rect">
-            <a:avLst/>
-          </a:prstGeom>
-        </p:spPr>
-        <p:txBody>
-          <a:bodyPr wrap="square">
-            <a:spAutoFit/>
-          </a:bodyPr>
-          <a:lstStyle/>
-          <a:p>
-            <a:r>
-              <a:rPr lang="en-US" dirty="0" smtClean="0">
-                <a:hlinkClick r:id="rId3"/>
-              </a:rPr>
-              <a:t>Source: https</a:t>
-            </a:r>
-            <a:r>
-              <a:rPr lang="en-US" dirty="0">
-                <a:hlinkClick r:id="rId3"/>
-              </a:rPr>
-              <a:t>://slides.ourworldindata.org/2020_pandemic/2020_pandemic#/title-slide</a:t>
-            </a:r>
-            <a:endParaRPr lang="en-US" dirty="0"/>
-          </a:p>
-        </p:txBody>
-      </p:sp>
       <p:pic>
         <p:nvPicPr>
           <p:cNvPr id="3" name="Picture 2"/>
@@ -7504,7 +7467,7 @@
           <p:nvPr/>
         </p:nvPicPr>
         <p:blipFill>
-          <a:blip r:embed="rId4"/>
+          <a:blip r:embed="rId3"/>
           <a:stretch>
             <a:fillRect/>
           </a:stretch>
@@ -7528,7 +7491,7 @@
           <p:nvPr/>
         </p:nvPicPr>
         <p:blipFill>
-          <a:blip r:embed="rId5"/>
+          <a:blip r:embed="rId4"/>
           <a:stretch>
             <a:fillRect/>
           </a:stretch>
@@ -7552,7 +7515,7 @@
           <p:nvPr/>
         </p:nvPicPr>
         <p:blipFill>
-          <a:blip r:embed="rId6"/>
+          <a:blip r:embed="rId5"/>
           <a:stretch>
             <a:fillRect/>
           </a:stretch>
@@ -7746,16 +7709,10 @@
               <a:buNone/>
             </a:pPr>
             <a:r>
-              <a:rPr lang="en-US" sz="2800" dirty="0" smtClean="0">
-                <a:hlinkClick r:id="rId3"/>
+              <a:rPr lang="en-US" sz="2800" dirty="0">
+                <a:hlinkClick r:id="rId4"/>
               </a:rPr>
-              <a:t>https</a:t>
-            </a:r>
-            <a:r>
-              <a:rPr lang="en-US" sz="2800" dirty="0">
-                <a:hlinkClick r:id="rId3"/>
-              </a:rPr>
-              <a:t>://github.com/praveenraghuvanshi1512/TechnicalSessions/tree/31052020-virtualmlnet/31052020-virtualmlnet</a:t>
+              <a:t>https://github.com/praveenraghuvanshi1512/TechnicalSessions/tree/master/31052020-virtualmlnet</a:t>
             </a:r>
             <a:endParaRPr lang="en-US" sz="2800" dirty="0"/>
           </a:p>
@@ -8695,17 +8652,8 @@
             </a:pPr>
             <a:r>
               <a:rPr lang="en-US" sz="3200" dirty="0" smtClean="0"/>
-              <a:t>Organizers - Alexander </a:t>
-            </a:r>
-            <a:r>
-              <a:rPr lang="en-US" sz="3200" dirty="0" smtClean="0"/>
-              <a:t>and </a:t>
-            </a:r>
-            <a:r>
-              <a:rPr lang="en-US" sz="3200" dirty="0" smtClean="0"/>
-              <a:t>Jon</a:t>
-            </a:r>
-            <a:endParaRPr lang="en-US" sz="3200" dirty="0" smtClean="0"/>
+              <a:t>Organizers - Alexander and Jon</a:t>
+            </a:r>
           </a:p>
           <a:p>
             <a:pPr lvl="1" fontAlgn="base">
@@ -8729,11 +8677,7 @@
             </a:r>
             <a:r>
               <a:rPr lang="en-US" sz="3200" dirty="0" smtClean="0"/>
-              <a:t> </a:t>
-            </a:r>
-            <a:r>
-              <a:rPr lang="en-US" sz="3200" dirty="0" smtClean="0"/>
-              <a:t>and </a:t>
+              <a:t> and </a:t>
             </a:r>
             <a:r>
               <a:rPr lang="en-US" sz="3200" dirty="0" err="1" smtClean="0"/>
@@ -9681,15 +9625,7 @@
           <a:p>
             <a:r>
               <a:rPr lang="en-US" dirty="0" smtClean="0"/>
-              <a:t>COVID-19 (Statistics) : May </a:t>
-            </a:r>
-            <a:r>
-              <a:rPr lang="en-US" dirty="0" smtClean="0"/>
-              <a:t>28, </a:t>
-            </a:r>
-            <a:r>
-              <a:rPr lang="en-US" dirty="0" smtClean="0"/>
-              <a:t>2020</a:t>
+              <a:t>COVID-19 (Statistics) : May 28, 2020</a:t>
             </a:r>
             <a:endParaRPr lang="en-US" dirty="0"/>
           </a:p>
@@ -10043,15 +9979,7 @@
           <a:p>
             <a:r>
               <a:rPr lang="en-US" dirty="0" smtClean="0"/>
-              <a:t>COVID-19 (Statistics) : May </a:t>
-            </a:r>
-            <a:r>
-              <a:rPr lang="en-US" dirty="0" smtClean="0"/>
-              <a:t>27, </a:t>
-            </a:r>
-            <a:r>
-              <a:rPr lang="en-US" dirty="0" smtClean="0"/>
-              <a:t>2020</a:t>
+              <a:t>COVID-19 (Statistics) : May 27, 2020</a:t>
             </a:r>
             <a:endParaRPr lang="en-US" dirty="0"/>
           </a:p>
@@ -11443,11 +11371,7 @@
             </a:r>
             <a:r>
               <a:rPr lang="en-US" sz="3000" dirty="0"/>
-              <a:t>The </a:t>
-            </a:r>
-            <a:r>
-              <a:rPr lang="en-US" sz="3000" dirty="0"/>
-              <a:t>analysis of data organized </a:t>
+              <a:t>The analysis of data organized </a:t>
             </a:r>
             <a:r>
               <a:rPr lang="en-US" sz="3000" dirty="0" smtClean="0"/>
@@ -11455,11 +11379,7 @@
             </a:r>
             <a:r>
               <a:rPr lang="en-US" sz="3000" dirty="0"/>
-              <a:t>units of time</a:t>
-            </a:r>
-            <a:r>
-              <a:rPr lang="en-US" sz="3000" dirty="0"/>
-              <a:t>.</a:t>
+              <a:t>units of time.</a:t>
             </a:r>
           </a:p>
           <a:p>

</xml_diff>

<commit_message>
Updated csv and ppt and notebook
</commit_message>
<xml_diff>
--- a/31052020-virtualmlnet/virtualmlnet-2020.pptx
+++ b/31052020-virtualmlnet/virtualmlnet-2020.pptx
@@ -7498,7 +7498,7 @@
         </p:blipFill>
         <p:spPr>
           <a:xfrm>
-            <a:off x="5480180" y="1897211"/>
+            <a:off x="7297748" y="1897211"/>
             <a:ext cx="4284471" cy="3153762"/>
           </a:xfrm>
           <a:prstGeom prst="rect">
@@ -7522,7 +7522,7 @@
         </p:blipFill>
         <p:spPr>
           <a:xfrm>
-            <a:off x="9870951" y="1897210"/>
+            <a:off x="5445255" y="1888844"/>
             <a:ext cx="1781118" cy="3162129"/>
           </a:xfrm>
           <a:prstGeom prst="rect">
@@ -7543,7 +7543,303 @@
   <p:timing>
     <p:tnLst>
       <p:par>
-        <p:cTn id="1" dur="indefinite" restart="never" nodeType="tmRoot"/>
+        <p:cTn id="1" dur="indefinite" restart="never" nodeType="tmRoot">
+          <p:childTnLst>
+            <p:seq concurrent="1" nextAc="seek">
+              <p:cTn id="2" dur="indefinite" nodeType="mainSeq">
+                <p:childTnLst>
+                  <p:par>
+                    <p:cTn id="3" fill="hold">
+                      <p:stCondLst>
+                        <p:cond delay="indefinite"/>
+                      </p:stCondLst>
+                      <p:childTnLst>
+                        <p:par>
+                          <p:cTn id="4" fill="hold">
+                            <p:stCondLst>
+                              <p:cond delay="0"/>
+                            </p:stCondLst>
+                            <p:childTnLst>
+                              <p:par>
+                                <p:cTn id="5" presetID="2" presetClass="entr" presetSubtype="4" fill="hold" nodeType="clickEffect">
+                                  <p:stCondLst>
+                                    <p:cond delay="0"/>
+                                  </p:stCondLst>
+                                  <p:childTnLst>
+                                    <p:set>
+                                      <p:cBhvr>
+                                        <p:cTn id="6" dur="1" fill="hold">
+                                          <p:stCondLst>
+                                            <p:cond delay="0"/>
+                                          </p:stCondLst>
+                                        </p:cTn>
+                                        <p:tgtEl>
+                                          <p:spTgt spid="3"/>
+                                        </p:tgtEl>
+                                        <p:attrNameLst>
+                                          <p:attrName>style.visibility</p:attrName>
+                                        </p:attrNameLst>
+                                      </p:cBhvr>
+                                      <p:to>
+                                        <p:strVal val="visible"/>
+                                      </p:to>
+                                    </p:set>
+                                    <p:anim calcmode="lin" valueType="num">
+                                      <p:cBhvr additive="base">
+                                        <p:cTn id="7" dur="500" fill="hold"/>
+                                        <p:tgtEl>
+                                          <p:spTgt spid="3"/>
+                                        </p:tgtEl>
+                                        <p:attrNameLst>
+                                          <p:attrName>ppt_x</p:attrName>
+                                        </p:attrNameLst>
+                                      </p:cBhvr>
+                                      <p:tavLst>
+                                        <p:tav tm="0">
+                                          <p:val>
+                                            <p:strVal val="#ppt_x"/>
+                                          </p:val>
+                                        </p:tav>
+                                        <p:tav tm="100000">
+                                          <p:val>
+                                            <p:strVal val="#ppt_x"/>
+                                          </p:val>
+                                        </p:tav>
+                                      </p:tavLst>
+                                    </p:anim>
+                                    <p:anim calcmode="lin" valueType="num">
+                                      <p:cBhvr additive="base">
+                                        <p:cTn id="8" dur="500" fill="hold"/>
+                                        <p:tgtEl>
+                                          <p:spTgt spid="3"/>
+                                        </p:tgtEl>
+                                        <p:attrNameLst>
+                                          <p:attrName>ppt_y</p:attrName>
+                                        </p:attrNameLst>
+                                      </p:cBhvr>
+                                      <p:tavLst>
+                                        <p:tav tm="0">
+                                          <p:val>
+                                            <p:strVal val="1+#ppt_h/2"/>
+                                          </p:val>
+                                        </p:tav>
+                                        <p:tav tm="100000">
+                                          <p:val>
+                                            <p:strVal val="#ppt_y"/>
+                                          </p:val>
+                                        </p:tav>
+                                      </p:tavLst>
+                                    </p:anim>
+                                  </p:childTnLst>
+                                </p:cTn>
+                              </p:par>
+                            </p:childTnLst>
+                          </p:cTn>
+                        </p:par>
+                      </p:childTnLst>
+                    </p:cTn>
+                  </p:par>
+                  <p:par>
+                    <p:cTn id="9" fill="hold">
+                      <p:stCondLst>
+                        <p:cond delay="indefinite"/>
+                      </p:stCondLst>
+                      <p:childTnLst>
+                        <p:par>
+                          <p:cTn id="10" fill="hold">
+                            <p:stCondLst>
+                              <p:cond delay="0"/>
+                            </p:stCondLst>
+                            <p:childTnLst>
+                              <p:par>
+                                <p:cTn id="11" presetID="2" presetClass="entr" presetSubtype="4" fill="hold" nodeType="clickEffect">
+                                  <p:stCondLst>
+                                    <p:cond delay="0"/>
+                                  </p:stCondLst>
+                                  <p:childTnLst>
+                                    <p:set>
+                                      <p:cBhvr>
+                                        <p:cTn id="12" dur="1" fill="hold">
+                                          <p:stCondLst>
+                                            <p:cond delay="0"/>
+                                          </p:stCondLst>
+                                        </p:cTn>
+                                        <p:tgtEl>
+                                          <p:spTgt spid="8"/>
+                                        </p:tgtEl>
+                                        <p:attrNameLst>
+                                          <p:attrName>style.visibility</p:attrName>
+                                        </p:attrNameLst>
+                                      </p:cBhvr>
+                                      <p:to>
+                                        <p:strVal val="visible"/>
+                                      </p:to>
+                                    </p:set>
+                                    <p:anim calcmode="lin" valueType="num">
+                                      <p:cBhvr additive="base">
+                                        <p:cTn id="13" dur="500" fill="hold"/>
+                                        <p:tgtEl>
+                                          <p:spTgt spid="8"/>
+                                        </p:tgtEl>
+                                        <p:attrNameLst>
+                                          <p:attrName>ppt_x</p:attrName>
+                                        </p:attrNameLst>
+                                      </p:cBhvr>
+                                      <p:tavLst>
+                                        <p:tav tm="0">
+                                          <p:val>
+                                            <p:strVal val="#ppt_x"/>
+                                          </p:val>
+                                        </p:tav>
+                                        <p:tav tm="100000">
+                                          <p:val>
+                                            <p:strVal val="#ppt_x"/>
+                                          </p:val>
+                                        </p:tav>
+                                      </p:tavLst>
+                                    </p:anim>
+                                    <p:anim calcmode="lin" valueType="num">
+                                      <p:cBhvr additive="base">
+                                        <p:cTn id="14" dur="500" fill="hold"/>
+                                        <p:tgtEl>
+                                          <p:spTgt spid="8"/>
+                                        </p:tgtEl>
+                                        <p:attrNameLst>
+                                          <p:attrName>ppt_y</p:attrName>
+                                        </p:attrNameLst>
+                                      </p:cBhvr>
+                                      <p:tavLst>
+                                        <p:tav tm="0">
+                                          <p:val>
+                                            <p:strVal val="1+#ppt_h/2"/>
+                                          </p:val>
+                                        </p:tav>
+                                        <p:tav tm="100000">
+                                          <p:val>
+                                            <p:strVal val="#ppt_y"/>
+                                          </p:val>
+                                        </p:tav>
+                                      </p:tavLst>
+                                    </p:anim>
+                                  </p:childTnLst>
+                                </p:cTn>
+                              </p:par>
+                            </p:childTnLst>
+                          </p:cTn>
+                        </p:par>
+                      </p:childTnLst>
+                    </p:cTn>
+                  </p:par>
+                  <p:par>
+                    <p:cTn id="15" fill="hold">
+                      <p:stCondLst>
+                        <p:cond delay="indefinite"/>
+                      </p:stCondLst>
+                      <p:childTnLst>
+                        <p:par>
+                          <p:cTn id="16" fill="hold">
+                            <p:stCondLst>
+                              <p:cond delay="0"/>
+                            </p:stCondLst>
+                            <p:childTnLst>
+                              <p:par>
+                                <p:cTn id="17" presetID="2" presetClass="entr" presetSubtype="4" fill="hold" nodeType="clickEffect">
+                                  <p:stCondLst>
+                                    <p:cond delay="0"/>
+                                  </p:stCondLst>
+                                  <p:childTnLst>
+                                    <p:set>
+                                      <p:cBhvr>
+                                        <p:cTn id="18" dur="1" fill="hold">
+                                          <p:stCondLst>
+                                            <p:cond delay="0"/>
+                                          </p:stCondLst>
+                                        </p:cTn>
+                                        <p:tgtEl>
+                                          <p:spTgt spid="7"/>
+                                        </p:tgtEl>
+                                        <p:attrNameLst>
+                                          <p:attrName>style.visibility</p:attrName>
+                                        </p:attrNameLst>
+                                      </p:cBhvr>
+                                      <p:to>
+                                        <p:strVal val="visible"/>
+                                      </p:to>
+                                    </p:set>
+                                    <p:anim calcmode="lin" valueType="num">
+                                      <p:cBhvr additive="base">
+                                        <p:cTn id="19" dur="500" fill="hold"/>
+                                        <p:tgtEl>
+                                          <p:spTgt spid="7"/>
+                                        </p:tgtEl>
+                                        <p:attrNameLst>
+                                          <p:attrName>ppt_x</p:attrName>
+                                        </p:attrNameLst>
+                                      </p:cBhvr>
+                                      <p:tavLst>
+                                        <p:tav tm="0">
+                                          <p:val>
+                                            <p:strVal val="#ppt_x"/>
+                                          </p:val>
+                                        </p:tav>
+                                        <p:tav tm="100000">
+                                          <p:val>
+                                            <p:strVal val="#ppt_x"/>
+                                          </p:val>
+                                        </p:tav>
+                                      </p:tavLst>
+                                    </p:anim>
+                                    <p:anim calcmode="lin" valueType="num">
+                                      <p:cBhvr additive="base">
+                                        <p:cTn id="20" dur="500" fill="hold"/>
+                                        <p:tgtEl>
+                                          <p:spTgt spid="7"/>
+                                        </p:tgtEl>
+                                        <p:attrNameLst>
+                                          <p:attrName>ppt_y</p:attrName>
+                                        </p:attrNameLst>
+                                      </p:cBhvr>
+                                      <p:tavLst>
+                                        <p:tav tm="0">
+                                          <p:val>
+                                            <p:strVal val="1+#ppt_h/2"/>
+                                          </p:val>
+                                        </p:tav>
+                                        <p:tav tm="100000">
+                                          <p:val>
+                                            <p:strVal val="#ppt_y"/>
+                                          </p:val>
+                                        </p:tav>
+                                      </p:tavLst>
+                                    </p:anim>
+                                  </p:childTnLst>
+                                </p:cTn>
+                              </p:par>
+                            </p:childTnLst>
+                          </p:cTn>
+                        </p:par>
+                      </p:childTnLst>
+                    </p:cTn>
+                  </p:par>
+                </p:childTnLst>
+              </p:cTn>
+              <p:prevCondLst>
+                <p:cond evt="onPrev" delay="0">
+                  <p:tgtEl>
+                    <p:sldTgt/>
+                  </p:tgtEl>
+                </p:cond>
+              </p:prevCondLst>
+              <p:nextCondLst>
+                <p:cond evt="onNext" delay="0">
+                  <p:tgtEl>
+                    <p:sldTgt/>
+                  </p:tgtEl>
+                </p:cond>
+              </p:nextCondLst>
+            </p:seq>
+          </p:childTnLst>
+        </p:cTn>
       </p:par>
     </p:tnLst>
   </p:timing>
@@ -7900,8 +8196,17 @@
               <a:rPr lang="en-US" sz="8000" dirty="0" smtClean="0">
                 <a:hlinkClick r:id="rId4"/>
               </a:rPr>
-              <a:t>@praveenraghuvan</a:t>
-            </a:r>
+              <a:t>@</a:t>
+            </a:r>
+            <a:r>
+              <a:rPr lang="en-US" sz="8000" dirty="0" err="1" smtClean="0">
+                <a:hlinkClick r:id="rId4"/>
+              </a:rPr>
+              <a:t>praveenraghuvan</a:t>
+            </a:r>
+            <a:endParaRPr lang="en-US" sz="8000" dirty="0" smtClean="0">
+              <a:hlinkClick r:id="rId4"/>
+            </a:endParaRPr>
           </a:p>
           <a:p>
             <a:pPr marL="0" indent="0">
@@ -8040,6 +8345,104 @@
           <a:xfrm>
             <a:off x="4558099" y="3825240"/>
             <a:ext cx="479672" cy="500453"/>
+          </a:xfrm>
+          <a:prstGeom prst="rect">
+            <a:avLst/>
+          </a:prstGeom>
+          <a:noFill/>
+          <a:extLst>
+            <a:ext uri="{909E8E84-426E-40DD-AFC4-6F175D3DCCD1}">
+              <a14:hiddenFill xmlns:a14="http://schemas.microsoft.com/office/drawing/2010/main">
+                <a:solidFill>
+                  <a:srgbClr val="FFFFFF"/>
+                </a:solidFill>
+              </a14:hiddenFill>
+            </a:ext>
+          </a:extLst>
+        </p:spPr>
+      </p:pic>
+      <p:sp>
+        <p:nvSpPr>
+          <p:cNvPr id="4" name="TextBox 3"/>
+          <p:cNvSpPr txBox="1"/>
+          <p:nvPr/>
+        </p:nvSpPr>
+        <p:spPr>
+          <a:xfrm>
+            <a:off x="5240746" y="6242055"/>
+            <a:ext cx="6728096" cy="492443"/>
+          </a:xfrm>
+          <a:prstGeom prst="rect">
+            <a:avLst/>
+          </a:prstGeom>
+          <a:noFill/>
+        </p:spPr>
+        <p:txBody>
+          <a:bodyPr wrap="square" rtlCol="0">
+            <a:spAutoFit/>
+          </a:bodyPr>
+          <a:lstStyle/>
+          <a:p>
+            <a:r>
+              <a:rPr lang="en-US" sz="2600" dirty="0">
+                <a:solidFill>
+                  <a:schemeClr val="tx1">
+                    <a:lumMod val="75000"/>
+                    <a:lumOff val="25000"/>
+                  </a:schemeClr>
+                </a:solidFill>
+                <a:hlinkClick r:id="rId9"/>
+              </a:rPr>
+              <a:t>https</a:t>
+            </a:r>
+            <a:r>
+              <a:rPr lang="en-US" sz="2600" dirty="0">
+                <a:solidFill>
+                  <a:schemeClr val="tx1">
+                    <a:lumMod val="75000"/>
+                    <a:lumOff val="25000"/>
+                  </a:schemeClr>
+                </a:solidFill>
+                <a:hlinkClick r:id="rId9"/>
+              </a:rPr>
+              <a:t>://t.me/joinchat/IifUJQ_PuYT757Turx-nLg </a:t>
+            </a:r>
+            <a:endParaRPr lang="en-US" sz="2600" dirty="0">
+              <a:solidFill>
+                <a:schemeClr val="tx1">
+                  <a:lumMod val="75000"/>
+                  <a:lumOff val="25000"/>
+                </a:schemeClr>
+              </a:solidFill>
+            </a:endParaRPr>
+          </a:p>
+        </p:txBody>
+      </p:sp>
+      <p:pic>
+        <p:nvPicPr>
+          <p:cNvPr id="1032" name="Picture 8" descr="circle messenger round icon telegram icon #21808"/>
+          <p:cNvPicPr>
+            <a:picLocks noChangeAspect="1" noChangeArrowheads="1"/>
+          </p:cNvPicPr>
+          <p:nvPr/>
+        </p:nvPicPr>
+        <p:blipFill>
+          <a:blip r:embed="rId10">
+            <a:extLst>
+              <a:ext uri="{28A0092B-C50C-407E-A947-70E740481C1C}">
+                <a14:useLocalDpi xmlns:a14="http://schemas.microsoft.com/office/drawing/2010/main" val="0"/>
+              </a:ext>
+            </a:extLst>
+          </a:blip>
+          <a:srcRect/>
+          <a:stretch>
+            <a:fillRect/>
+          </a:stretch>
+        </p:blipFill>
+        <p:spPr bwMode="auto">
+          <a:xfrm>
+            <a:off x="4557347" y="6258415"/>
+            <a:ext cx="494123" cy="494123"/>
           </a:xfrm>
           <a:prstGeom prst="rect">
             <a:avLst/>

</xml_diff>

<commit_message>
Updated part-2 and ppt
</commit_message>
<xml_diff>
--- a/31052020-virtualmlnet/virtualmlnet-2020.pptx
+++ b/31052020-virtualmlnet/virtualmlnet-2020.pptx
@@ -5,7 +5,7 @@
     <p:sldMasterId id="2147483717" r:id="rId1"/>
   </p:sldMasterIdLst>
   <p:notesMasterIdLst>
-    <p:notesMasterId r:id="rId19"/>
+    <p:notesMasterId r:id="rId20"/>
   </p:notesMasterIdLst>
   <p:sldIdLst>
     <p:sldId id="256" r:id="rId2"/>
@@ -18,13 +18,14 @@
     <p:sldId id="315" r:id="rId9"/>
     <p:sldId id="317" r:id="rId10"/>
     <p:sldId id="318" r:id="rId11"/>
-    <p:sldId id="319" r:id="rId12"/>
-    <p:sldId id="320" r:id="rId13"/>
-    <p:sldId id="326" r:id="rId14"/>
-    <p:sldId id="327" r:id="rId15"/>
-    <p:sldId id="321" r:id="rId16"/>
-    <p:sldId id="324" r:id="rId17"/>
-    <p:sldId id="325" r:id="rId18"/>
+    <p:sldId id="328" r:id="rId12"/>
+    <p:sldId id="319" r:id="rId13"/>
+    <p:sldId id="320" r:id="rId14"/>
+    <p:sldId id="326" r:id="rId15"/>
+    <p:sldId id="327" r:id="rId16"/>
+    <p:sldId id="321" r:id="rId17"/>
+    <p:sldId id="324" r:id="rId18"/>
+    <p:sldId id="325" r:id="rId19"/>
   </p:sldIdLst>
   <p:sldSz cx="12192000" cy="6858000"/>
   <p:notesSz cx="6858000" cy="9144000"/>
@@ -609,6 +610,22 @@
           <a:bodyPr/>
           <a:lstStyle/>
           <a:p>
+            <a:r>
+              <a:rPr lang="en-US" dirty="0" smtClean="0"/>
+              <a:t>- S</a:t>
+            </a:r>
+            <a:r>
+              <a:rPr lang="en-US" sz="1200" b="0" i="0" kern="1200" dirty="0" smtClean="0">
+                <a:solidFill>
+                  <a:schemeClr val="tx1"/>
+                </a:solidFill>
+                <a:effectLst/>
+                <a:latin typeface="+mn-lt"/>
+                <a:ea typeface="+mn-ea"/>
+                <a:cs typeface="+mn-cs"/>
+              </a:rPr>
+              <a:t>QL Server, Azure SQL Database, Oracle, SQLite, PostgreSQL, Progress, IBM DB2</a:t>
+            </a:r>
             <a:endParaRPr lang="en-US" dirty="0"/>
           </a:p>
         </p:txBody>
@@ -639,7 +656,7 @@
     </p:spTree>
     <p:extLst>
       <p:ext uri="{BB962C8B-B14F-4D97-AF65-F5344CB8AC3E}">
-        <p14:creationId xmlns:p14="http://schemas.microsoft.com/office/powerpoint/2010/main" val="1573140850"/>
+        <p14:creationId xmlns:p14="http://schemas.microsoft.com/office/powerpoint/2010/main" val="637572581"/>
       </p:ext>
     </p:extLst>
   </p:cSld>
@@ -723,7 +740,7 @@
     </p:spTree>
     <p:extLst>
       <p:ext uri="{BB962C8B-B14F-4D97-AF65-F5344CB8AC3E}">
-        <p14:creationId xmlns:p14="http://schemas.microsoft.com/office/powerpoint/2010/main" val="2254359970"/>
+        <p14:creationId xmlns:p14="http://schemas.microsoft.com/office/powerpoint/2010/main" val="1573140850"/>
       </p:ext>
     </p:extLst>
   </p:cSld>
@@ -807,7 +824,7 @@
     </p:spTree>
     <p:extLst>
       <p:ext uri="{BB962C8B-B14F-4D97-AF65-F5344CB8AC3E}">
-        <p14:creationId xmlns:p14="http://schemas.microsoft.com/office/powerpoint/2010/main" val="382722078"/>
+        <p14:creationId xmlns:p14="http://schemas.microsoft.com/office/powerpoint/2010/main" val="2254359970"/>
       </p:ext>
     </p:extLst>
   </p:cSld>
@@ -891,7 +908,7 @@
     </p:spTree>
     <p:extLst>
       <p:ext uri="{BB962C8B-B14F-4D97-AF65-F5344CB8AC3E}">
-        <p14:creationId xmlns:p14="http://schemas.microsoft.com/office/powerpoint/2010/main" val="3925919008"/>
+        <p14:creationId xmlns:p14="http://schemas.microsoft.com/office/powerpoint/2010/main" val="382722078"/>
       </p:ext>
     </p:extLst>
   </p:cSld>
@@ -975,7 +992,7 @@
     </p:spTree>
     <p:extLst>
       <p:ext uri="{BB962C8B-B14F-4D97-AF65-F5344CB8AC3E}">
-        <p14:creationId xmlns:p14="http://schemas.microsoft.com/office/powerpoint/2010/main" val="2773224715"/>
+        <p14:creationId xmlns:p14="http://schemas.microsoft.com/office/powerpoint/2010/main" val="3925919008"/>
       </p:ext>
     </p:extLst>
   </p:cSld>
@@ -1059,7 +1076,7 @@
     </p:spTree>
     <p:extLst>
       <p:ext uri="{BB962C8B-B14F-4D97-AF65-F5344CB8AC3E}">
-        <p14:creationId xmlns:p14="http://schemas.microsoft.com/office/powerpoint/2010/main" val="1766728910"/>
+        <p14:creationId xmlns:p14="http://schemas.microsoft.com/office/powerpoint/2010/main" val="2773224715"/>
       </p:ext>
     </p:extLst>
   </p:cSld>
@@ -1135,6 +1152,90 @@
             <a:fld id="{55849CEA-452E-49F3-92ED-210B64DD3C6C}" type="slidenum">
               <a:rPr lang="en-US" smtClean="0"/>
               <a:t>17</a:t>
+            </a:fld>
+            <a:endParaRPr lang="en-US" dirty="0"/>
+          </a:p>
+        </p:txBody>
+      </p:sp>
+    </p:spTree>
+    <p:extLst>
+      <p:ext uri="{BB962C8B-B14F-4D97-AF65-F5344CB8AC3E}">
+        <p14:creationId xmlns:p14="http://schemas.microsoft.com/office/powerpoint/2010/main" val="1766728910"/>
+      </p:ext>
+    </p:extLst>
+  </p:cSld>
+  <p:clrMapOvr>
+    <a:masterClrMapping/>
+  </p:clrMapOvr>
+</p:notes>
+</file>
+
+<file path=ppt/notesSlides/notesSlide17.xml><?xml version="1.0" encoding="utf-8"?>
+<p:notes xmlns:a="http://schemas.openxmlformats.org/drawingml/2006/main" xmlns:r="http://schemas.openxmlformats.org/officeDocument/2006/relationships" xmlns:p="http://schemas.openxmlformats.org/presentationml/2006/main">
+  <p:cSld>
+    <p:spTree>
+      <p:nvGrpSpPr>
+        <p:cNvPr id="1" name=""/>
+        <p:cNvGrpSpPr/>
+        <p:nvPr/>
+      </p:nvGrpSpPr>
+      <p:grpSpPr>
+        <a:xfrm>
+          <a:off x="0" y="0"/>
+          <a:ext cx="0" cy="0"/>
+          <a:chOff x="0" y="0"/>
+          <a:chExt cx="0" cy="0"/>
+        </a:xfrm>
+      </p:grpSpPr>
+      <p:sp>
+        <p:nvSpPr>
+          <p:cNvPr id="2" name="Slide Image Placeholder 1"/>
+          <p:cNvSpPr>
+            <a:spLocks noGrp="1" noRot="1" noChangeAspect="1"/>
+          </p:cNvSpPr>
+          <p:nvPr>
+            <p:ph type="sldImg"/>
+          </p:nvPr>
+        </p:nvSpPr>
+        <p:spPr/>
+      </p:sp>
+      <p:sp>
+        <p:nvSpPr>
+          <p:cNvPr id="3" name="Notes Placeholder 2"/>
+          <p:cNvSpPr>
+            <a:spLocks noGrp="1"/>
+          </p:cNvSpPr>
+          <p:nvPr>
+            <p:ph type="body" idx="1"/>
+          </p:nvPr>
+        </p:nvSpPr>
+        <p:spPr/>
+        <p:txBody>
+          <a:bodyPr/>
+          <a:lstStyle/>
+          <a:p>
+            <a:endParaRPr lang="en-US" dirty="0"/>
+          </a:p>
+        </p:txBody>
+      </p:sp>
+      <p:sp>
+        <p:nvSpPr>
+          <p:cNvPr id="4" name="Slide Number Placeholder 3"/>
+          <p:cNvSpPr>
+            <a:spLocks noGrp="1"/>
+          </p:cNvSpPr>
+          <p:nvPr>
+            <p:ph type="sldNum" sz="quarter" idx="10"/>
+          </p:nvPr>
+        </p:nvSpPr>
+        <p:spPr/>
+        <p:txBody>
+          <a:bodyPr/>
+          <a:lstStyle/>
+          <a:p>
+            <a:fld id="{55849CEA-452E-49F3-92ED-210B64DD3C6C}" type="slidenum">
+              <a:rPr lang="en-US" smtClean="0"/>
+              <a:t>18</a:t>
             </a:fld>
             <a:endParaRPr lang="en-US" dirty="0"/>
           </a:p>
@@ -5739,7 +5840,7 @@
         </p:nvSpPr>
         <p:spPr>
           <a:xfrm>
-            <a:off x="1141411" y="619127"/>
+            <a:off x="1150120" y="619127"/>
             <a:ext cx="9906000" cy="834536"/>
           </a:xfrm>
         </p:spPr>
@@ -5848,20 +5949,6 @@
             </a:r>
             <a:endParaRPr lang="en-US" sz="2800" dirty="0" smtClean="0"/>
           </a:p>
-          <a:p>
-            <a:pPr marL="914400" lvl="1" indent="-457200" fontAlgn="base">
-              <a:lnSpc>
-                <a:spcPct val="150000"/>
-              </a:lnSpc>
-              <a:buFont typeface="Arial" panose="020B0604020202020204" pitchFamily="34" charset="0"/>
-              <a:buChar char="•"/>
-            </a:pPr>
-            <a:r>
-              <a:rPr lang="en-US" sz="2800" dirty="0" err="1" smtClean="0"/>
-              <a:t>Microsoft.Data.Analysis</a:t>
-            </a:r>
-            <a:endParaRPr lang="en-US" sz="2800" dirty="0"/>
-          </a:p>
         </p:txBody>
       </p:sp>
       <p:sp>
@@ -5876,7 +5963,7 @@
         </p:nvSpPr>
         <p:spPr>
           <a:xfrm>
-            <a:off x="6288175" y="1983812"/>
+            <a:off x="6288175" y="2236361"/>
             <a:ext cx="5025433" cy="3283132"/>
           </a:xfrm>
         </p:spPr>
@@ -6299,7 +6386,7 @@
                             </p:stCondLst>
                             <p:childTnLst>
                               <p:par>
-                                <p:cTn id="23" presetID="2" presetClass="entr" presetSubtype="4" fill="hold" nodeType="clickEffect">
+                                <p:cTn id="23" presetID="2" presetClass="entr" presetSubtype="4" fill="hold" grpId="0" nodeType="clickEffect">
                                   <p:stCondLst>
                                     <p:cond delay="0"/>
                                   </p:stCondLst>
@@ -6312,9 +6399,9 @@
                                           </p:stCondLst>
                                         </p:cTn>
                                         <p:tgtEl>
-                                          <p:spTgt spid="6">
+                                          <p:spTgt spid="7">
                                             <p:txEl>
-                                              <p:pRg st="3" end="3"/>
+                                              <p:pRg st="0" end="0"/>
                                             </p:txEl>
                                           </p:spTgt>
                                         </p:tgtEl>
@@ -6330,9 +6417,9 @@
                                       <p:cBhvr additive="base">
                                         <p:cTn id="25" dur="500" fill="hold"/>
                                         <p:tgtEl>
-                                          <p:spTgt spid="6">
+                                          <p:spTgt spid="7">
                                             <p:txEl>
-                                              <p:pRg st="3" end="3"/>
+                                              <p:pRg st="0" end="0"/>
                                             </p:txEl>
                                           </p:spTgt>
                                         </p:tgtEl>
@@ -6357,9 +6444,9 @@
                                       <p:cBhvr additive="base">
                                         <p:cTn id="26" dur="500" fill="hold"/>
                                         <p:tgtEl>
-                                          <p:spTgt spid="6">
+                                          <p:spTgt spid="7">
                                             <p:txEl>
-                                              <p:pRg st="3" end="3"/>
+                                              <p:pRg st="0" end="0"/>
                                             </p:txEl>
                                           </p:spTgt>
                                         </p:tgtEl>
@@ -6417,7 +6504,7 @@
                                         <p:tgtEl>
                                           <p:spTgt spid="7">
                                             <p:txEl>
-                                              <p:pRg st="0" end="0"/>
+                                              <p:pRg st="1" end="1"/>
                                             </p:txEl>
                                           </p:spTgt>
                                         </p:tgtEl>
@@ -6435,7 +6522,7 @@
                                         <p:tgtEl>
                                           <p:spTgt spid="7">
                                             <p:txEl>
-                                              <p:pRg st="0" end="0"/>
+                                              <p:pRg st="1" end="1"/>
                                             </p:txEl>
                                           </p:spTgt>
                                         </p:tgtEl>
@@ -6462,7 +6549,7 @@
                                         <p:tgtEl>
                                           <p:spTgt spid="7">
                                             <p:txEl>
-                                              <p:pRg st="0" end="0"/>
+                                              <p:pRg st="1" end="1"/>
                                             </p:txEl>
                                           </p:spTgt>
                                         </p:tgtEl>
@@ -6520,7 +6607,7 @@
                                         <p:tgtEl>
                                           <p:spTgt spid="7">
                                             <p:txEl>
-                                              <p:pRg st="1" end="1"/>
+                                              <p:pRg st="2" end="2"/>
                                             </p:txEl>
                                           </p:spTgt>
                                         </p:tgtEl>
@@ -6538,7 +6625,7 @@
                                         <p:tgtEl>
                                           <p:spTgt spid="7">
                                             <p:txEl>
-                                              <p:pRg st="1" end="1"/>
+                                              <p:pRg st="2" end="2"/>
                                             </p:txEl>
                                           </p:spTgt>
                                         </p:tgtEl>
@@ -6565,7 +6652,7 @@
                                         <p:tgtEl>
                                           <p:spTgt spid="7">
                                             <p:txEl>
-                                              <p:pRg st="1" end="1"/>
+                                              <p:pRg st="2" end="2"/>
                                             </p:txEl>
                                           </p:spTgt>
                                         </p:tgtEl>
@@ -6623,7 +6710,7 @@
                                         <p:tgtEl>
                                           <p:spTgt spid="7">
                                             <p:txEl>
-                                              <p:pRg st="2" end="2"/>
+                                              <p:pRg st="3" end="3"/>
                                             </p:txEl>
                                           </p:spTgt>
                                         </p:tgtEl>
@@ -6641,7 +6728,7 @@
                                         <p:tgtEl>
                                           <p:spTgt spid="7">
                                             <p:txEl>
-                                              <p:pRg st="2" end="2"/>
+                                              <p:pRg st="3" end="3"/>
                                             </p:txEl>
                                           </p:spTgt>
                                         </p:tgtEl>
@@ -6668,7 +6755,7 @@
                                         <p:tgtEl>
                                           <p:spTgt spid="7">
                                             <p:txEl>
-                                              <p:pRg st="2" end="2"/>
+                                              <p:pRg st="3" end="3"/>
                                             </p:txEl>
                                           </p:spTgt>
                                         </p:tgtEl>
@@ -6726,7 +6813,7 @@
                                         <p:tgtEl>
                                           <p:spTgt spid="7">
                                             <p:txEl>
-                                              <p:pRg st="3" end="3"/>
+                                              <p:pRg st="4" end="4"/>
                                             </p:txEl>
                                           </p:spTgt>
                                         </p:tgtEl>
@@ -6741,109 +6828,6 @@
                                     <p:anim calcmode="lin" valueType="num">
                                       <p:cBhvr additive="base">
                                         <p:cTn id="49" dur="500" fill="hold"/>
-                                        <p:tgtEl>
-                                          <p:spTgt spid="7">
-                                            <p:txEl>
-                                              <p:pRg st="3" end="3"/>
-                                            </p:txEl>
-                                          </p:spTgt>
-                                        </p:tgtEl>
-                                        <p:attrNameLst>
-                                          <p:attrName>ppt_x</p:attrName>
-                                        </p:attrNameLst>
-                                      </p:cBhvr>
-                                      <p:tavLst>
-                                        <p:tav tm="0">
-                                          <p:val>
-                                            <p:strVal val="#ppt_x"/>
-                                          </p:val>
-                                        </p:tav>
-                                        <p:tav tm="100000">
-                                          <p:val>
-                                            <p:strVal val="#ppt_x"/>
-                                          </p:val>
-                                        </p:tav>
-                                      </p:tavLst>
-                                    </p:anim>
-                                    <p:anim calcmode="lin" valueType="num">
-                                      <p:cBhvr additive="base">
-                                        <p:cTn id="50" dur="500" fill="hold"/>
-                                        <p:tgtEl>
-                                          <p:spTgt spid="7">
-                                            <p:txEl>
-                                              <p:pRg st="3" end="3"/>
-                                            </p:txEl>
-                                          </p:spTgt>
-                                        </p:tgtEl>
-                                        <p:attrNameLst>
-                                          <p:attrName>ppt_y</p:attrName>
-                                        </p:attrNameLst>
-                                      </p:cBhvr>
-                                      <p:tavLst>
-                                        <p:tav tm="0">
-                                          <p:val>
-                                            <p:strVal val="1+#ppt_h/2"/>
-                                          </p:val>
-                                        </p:tav>
-                                        <p:tav tm="100000">
-                                          <p:val>
-                                            <p:strVal val="#ppt_y"/>
-                                          </p:val>
-                                        </p:tav>
-                                      </p:tavLst>
-                                    </p:anim>
-                                  </p:childTnLst>
-                                </p:cTn>
-                              </p:par>
-                            </p:childTnLst>
-                          </p:cTn>
-                        </p:par>
-                      </p:childTnLst>
-                    </p:cTn>
-                  </p:par>
-                  <p:par>
-                    <p:cTn id="51" fill="hold">
-                      <p:stCondLst>
-                        <p:cond delay="indefinite"/>
-                      </p:stCondLst>
-                      <p:childTnLst>
-                        <p:par>
-                          <p:cTn id="52" fill="hold">
-                            <p:stCondLst>
-                              <p:cond delay="0"/>
-                            </p:stCondLst>
-                            <p:childTnLst>
-                              <p:par>
-                                <p:cTn id="53" presetID="2" presetClass="entr" presetSubtype="4" fill="hold" grpId="0" nodeType="clickEffect">
-                                  <p:stCondLst>
-                                    <p:cond delay="0"/>
-                                  </p:stCondLst>
-                                  <p:childTnLst>
-                                    <p:set>
-                                      <p:cBhvr>
-                                        <p:cTn id="54" dur="1" fill="hold">
-                                          <p:stCondLst>
-                                            <p:cond delay="0"/>
-                                          </p:stCondLst>
-                                        </p:cTn>
-                                        <p:tgtEl>
-                                          <p:spTgt spid="7">
-                                            <p:txEl>
-                                              <p:pRg st="4" end="4"/>
-                                            </p:txEl>
-                                          </p:spTgt>
-                                        </p:tgtEl>
-                                        <p:attrNameLst>
-                                          <p:attrName>style.visibility</p:attrName>
-                                        </p:attrNameLst>
-                                      </p:cBhvr>
-                                      <p:to>
-                                        <p:strVal val="visible"/>
-                                      </p:to>
-                                    </p:set>
-                                    <p:anim calcmode="lin" valueType="num">
-                                      <p:cBhvr additive="base">
-                                        <p:cTn id="55" dur="500" fill="hold"/>
                                         <p:tgtEl>
                                           <p:spTgt spid="7">
                                             <p:txEl>
@@ -6870,7 +6854,7 @@
                                     </p:anim>
                                     <p:anim calcmode="lin" valueType="num">
                                       <p:cBhvr additive="base">
-                                        <p:cTn id="56" dur="500" fill="hold"/>
+                                        <p:cTn id="50" dur="500" fill="hold"/>
                                         <p:tgtEl>
                                           <p:spTgt spid="7">
                                             <p:txEl>
@@ -6961,7 +6945,7 @@
         </p:nvSpPr>
         <p:spPr>
           <a:xfrm>
-            <a:off x="1141411" y="619127"/>
+            <a:off x="1150120" y="619127"/>
             <a:ext cx="9906000" cy="834536"/>
           </a:xfrm>
         </p:spPr>
@@ -6971,162 +6955,531 @@
           <a:p>
             <a:r>
               <a:rPr lang="en-US" dirty="0" err="1" smtClean="0"/>
-              <a:t>ML.Net</a:t>
+              <a:t>.Net</a:t>
+            </a:r>
+            <a:r>
+              <a:rPr lang="en-US" dirty="0" smtClean="0"/>
+              <a:t> </a:t>
+            </a:r>
+            <a:r>
+              <a:rPr lang="en-US" dirty="0" err="1" smtClean="0"/>
+              <a:t>DataFrame</a:t>
+            </a:r>
+            <a:r>
+              <a:rPr lang="en-US" dirty="0" smtClean="0"/>
+              <a:t> </a:t>
+            </a:r>
+            <a:r>
+              <a:rPr lang="en-US" dirty="0" smtClean="0"/>
+              <a:t>Vs </a:t>
+            </a:r>
+            <a:r>
+              <a:rPr lang="en-US" dirty="0" err="1" smtClean="0"/>
+              <a:t>IDataView</a:t>
             </a:r>
             <a:endParaRPr lang="en-US" dirty="0"/>
           </a:p>
         </p:txBody>
       </p:sp>
-      <p:sp>
-        <p:nvSpPr>
-          <p:cNvPr id="6" name="Content Placeholder 2"/>
-          <p:cNvSpPr>
-            <a:spLocks noGrp="1"/>
-          </p:cNvSpPr>
-          <p:nvPr>
-            <p:ph idx="1"/>
-          </p:nvPr>
-        </p:nvSpPr>
-        <p:spPr>
-          <a:xfrm>
-            <a:off x="940524" y="2154065"/>
-            <a:ext cx="5853467" cy="2738846"/>
-          </a:xfrm>
-        </p:spPr>
-        <p:txBody>
-          <a:bodyPr>
-            <a:noAutofit/>
-          </a:bodyPr>
-          <a:lstStyle/>
-          <a:p>
-            <a:pPr marL="914400" lvl="1" indent="-457200" fontAlgn="base">
-              <a:lnSpc>
-                <a:spcPct val="150000"/>
-              </a:lnSpc>
-              <a:buFont typeface="Arial" panose="020B0604020202020204" pitchFamily="34" charset="0"/>
-              <a:buChar char="•"/>
-            </a:pPr>
-            <a:r>
-              <a:rPr lang="en-US" sz="2800" dirty="0" smtClean="0"/>
-              <a:t>Time Series</a:t>
-            </a:r>
-          </a:p>
-          <a:p>
-            <a:pPr marL="914400" lvl="1" indent="-457200" fontAlgn="base">
-              <a:lnSpc>
-                <a:spcPct val="150000"/>
-              </a:lnSpc>
-              <a:buFont typeface="Arial" panose="020B0604020202020204" pitchFamily="34" charset="0"/>
-              <a:buChar char="•"/>
-            </a:pPr>
-            <a:r>
-              <a:rPr lang="en-US" sz="2800" dirty="0" smtClean="0"/>
-              <a:t>Load Data – </a:t>
-            </a:r>
-            <a:r>
-              <a:rPr lang="en-US" sz="2800" dirty="0" err="1" smtClean="0"/>
-              <a:t>MLContext</a:t>
-            </a:r>
-            <a:endParaRPr lang="en-US" sz="2800" dirty="0" smtClean="0"/>
-          </a:p>
-          <a:p>
-            <a:pPr marL="914400" lvl="1" indent="-457200" fontAlgn="base">
-              <a:lnSpc>
-                <a:spcPct val="150000"/>
-              </a:lnSpc>
-              <a:buFont typeface="Arial" panose="020B0604020202020204" pitchFamily="34" charset="0"/>
-              <a:buChar char="•"/>
-            </a:pPr>
-            <a:r>
-              <a:rPr lang="en-US" sz="2800" dirty="0" smtClean="0"/>
-              <a:t>ML Pipeline</a:t>
-            </a:r>
-          </a:p>
-          <a:p>
-            <a:pPr marL="914400" lvl="1" indent="-457200" fontAlgn="base">
-              <a:lnSpc>
-                <a:spcPct val="150000"/>
-              </a:lnSpc>
-              <a:buFont typeface="Arial" panose="020B0604020202020204" pitchFamily="34" charset="0"/>
-              <a:buChar char="•"/>
-            </a:pPr>
-            <a:r>
-              <a:rPr lang="en-US" sz="2800" dirty="0"/>
-              <a:t>Predicting Deaths in next 7 </a:t>
-            </a:r>
-            <a:r>
-              <a:rPr lang="en-US" sz="2800" dirty="0" smtClean="0"/>
-              <a:t>days</a:t>
-            </a:r>
-            <a:endParaRPr lang="en-US" sz="2800" dirty="0"/>
-          </a:p>
-        </p:txBody>
-      </p:sp>
-      <p:sp>
-        <p:nvSpPr>
-          <p:cNvPr id="7" name="Content Placeholder 2"/>
-          <p:cNvSpPr>
-            <a:spLocks noGrp="1"/>
-          </p:cNvSpPr>
-          <p:nvPr>
-            <p:ph idx="1"/>
-          </p:nvPr>
-        </p:nvSpPr>
-        <p:spPr>
-          <a:xfrm>
-            <a:off x="5934456" y="1941576"/>
-            <a:ext cx="6144769" cy="1734312"/>
-          </a:xfrm>
-        </p:spPr>
-        <p:txBody>
-          <a:bodyPr>
-            <a:noAutofit/>
-          </a:bodyPr>
-          <a:lstStyle/>
-          <a:p>
-            <a:pPr marL="914400" lvl="1" indent="-457200" fontAlgn="base">
-              <a:lnSpc>
-                <a:spcPct val="150000"/>
-              </a:lnSpc>
-              <a:buFont typeface="Arial" panose="020B0604020202020204" pitchFamily="34" charset="0"/>
-              <a:buChar char="•"/>
-            </a:pPr>
-            <a:r>
-              <a:rPr lang="en-US" sz="2800" dirty="0" smtClean="0">
-                <a:hlinkClick r:id="rId3"/>
-              </a:rPr>
-              <a:t>Single </a:t>
-            </a:r>
-            <a:r>
-              <a:rPr lang="en-US" sz="2800" dirty="0">
-                <a:hlinkClick r:id="rId3"/>
-              </a:rPr>
-              <a:t>Spectrum Analysis</a:t>
-            </a:r>
-            <a:endParaRPr lang="en-US" sz="2800" dirty="0"/>
-          </a:p>
-          <a:p>
-            <a:pPr marL="914400" lvl="1" indent="-457200" fontAlgn="base">
-              <a:lnSpc>
-                <a:spcPct val="150000"/>
-              </a:lnSpc>
-              <a:buFont typeface="Arial" panose="020B0604020202020204" pitchFamily="34" charset="0"/>
-              <a:buChar char="•"/>
-            </a:pPr>
-            <a:r>
-              <a:rPr lang="en-US" sz="2800" dirty="0" err="1">
-                <a:hlinkClick r:id="rId4"/>
-              </a:rPr>
-              <a:t>TimeSeriesCatalog.ForecastBySsa</a:t>
-            </a:r>
-            <a:endParaRPr lang="en-US" sz="2800" dirty="0"/>
-          </a:p>
-        </p:txBody>
-      </p:sp>
+      <p:graphicFrame>
+        <p:nvGraphicFramePr>
+          <p:cNvPr id="5" name="Table 4"/>
+          <p:cNvGraphicFramePr>
+            <a:graphicFrameLocks noGrp="1"/>
+          </p:cNvGraphicFramePr>
+          <p:nvPr>
+            <p:extLst>
+              <p:ext uri="{D42A27DB-BD31-4B8C-83A1-F6EECF244321}">
+                <p14:modId xmlns:p14="http://schemas.microsoft.com/office/powerpoint/2010/main" val="1420472505"/>
+              </p:ext>
+            </p:extLst>
+          </p:nvPr>
+        </p:nvGraphicFramePr>
+        <p:xfrm>
+          <a:off x="2149565" y="1867021"/>
+          <a:ext cx="8087362" cy="4354296"/>
+        </p:xfrm>
+        <a:graphic>
+          <a:graphicData uri="http://schemas.openxmlformats.org/drawingml/2006/table">
+            <a:tbl>
+              <a:tblPr firstRow="1" bandRow="1">
+                <a:tableStyleId>{5C22544A-7EE6-4342-B048-85BDC9FD1C3A}</a:tableStyleId>
+              </a:tblPr>
+              <a:tblGrid>
+                <a:gridCol w="4043681">
+                  <a:extLst>
+                    <a:ext uri="{9D8B030D-6E8A-4147-A177-3AD203B41FA5}">
+                      <a16:colId xmlns:a16="http://schemas.microsoft.com/office/drawing/2014/main" val="3920232602"/>
+                    </a:ext>
+                  </a:extLst>
+                </a:gridCol>
+                <a:gridCol w="4043681">
+                  <a:extLst>
+                    <a:ext uri="{9D8B030D-6E8A-4147-A177-3AD203B41FA5}">
+                      <a16:colId xmlns:a16="http://schemas.microsoft.com/office/drawing/2014/main" val="1530353186"/>
+                    </a:ext>
+                  </a:extLst>
+                </a:gridCol>
+              </a:tblGrid>
+              <a:tr h="371336">
+                <a:tc>
+                  <a:txBody>
+                    <a:bodyPr/>
+                    <a:lstStyle/>
+                    <a:p>
+                      <a:pPr algn="ctr"/>
+                      <a:r>
+                        <a:rPr lang="en-US" dirty="0" err="1" smtClean="0"/>
+                        <a:t>DataFrame</a:t>
+                      </a:r>
+                      <a:endParaRPr lang="en-US" dirty="0"/>
+                    </a:p>
+                  </a:txBody>
+                  <a:tcPr/>
+                </a:tc>
+                <a:tc>
+                  <a:txBody>
+                    <a:bodyPr/>
+                    <a:lstStyle/>
+                    <a:p>
+                      <a:pPr algn="ctr"/>
+                      <a:r>
+                        <a:rPr lang="en-US" dirty="0" err="1" smtClean="0"/>
+                        <a:t>IDataView</a:t>
+                      </a:r>
+                      <a:endParaRPr lang="en-US" dirty="0"/>
+                    </a:p>
+                  </a:txBody>
+                  <a:tcPr/>
+                </a:tc>
+                <a:extLst>
+                  <a:ext uri="{0D108BD9-81ED-4DB2-BD59-A6C34878D82A}">
+                    <a16:rowId xmlns:a16="http://schemas.microsoft.com/office/drawing/2014/main" val="2226968912"/>
+                  </a:ext>
+                </a:extLst>
+              </a:tr>
+              <a:tr h="371336">
+                <a:tc>
+                  <a:txBody>
+                    <a:bodyPr/>
+                    <a:lstStyle/>
+                    <a:p>
+                      <a:r>
+                        <a:rPr lang="en-US" dirty="0" err="1" smtClean="0"/>
+                        <a:t>Microsoft.Data</a:t>
+                      </a:r>
+                      <a:endParaRPr lang="en-US" dirty="0"/>
+                    </a:p>
+                  </a:txBody>
+                  <a:tcPr/>
+                </a:tc>
+                <a:tc>
+                  <a:txBody>
+                    <a:bodyPr/>
+                    <a:lstStyle/>
+                    <a:p>
+                      <a:r>
+                        <a:rPr lang="en-US" dirty="0" smtClean="0"/>
+                        <a:t>Microsoft.ML</a:t>
+                      </a:r>
+                      <a:endParaRPr lang="en-US" dirty="0"/>
+                    </a:p>
+                  </a:txBody>
+                  <a:tcPr/>
+                </a:tc>
+                <a:extLst>
+                  <a:ext uri="{0D108BD9-81ED-4DB2-BD59-A6C34878D82A}">
+                    <a16:rowId xmlns:a16="http://schemas.microsoft.com/office/drawing/2014/main" val="319929005"/>
+                  </a:ext>
+                </a:extLst>
+              </a:tr>
+              <a:tr h="371336">
+                <a:tc>
+                  <a:txBody>
+                    <a:bodyPr/>
+                    <a:lstStyle/>
+                    <a:p>
+                      <a:r>
+                        <a:rPr lang="en-US" dirty="0" smtClean="0"/>
+                        <a:t>Analogous to List</a:t>
+                      </a:r>
+                      <a:endParaRPr lang="en-US" dirty="0"/>
+                    </a:p>
+                  </a:txBody>
+                  <a:tcPr/>
+                </a:tc>
+                <a:tc>
+                  <a:txBody>
+                    <a:bodyPr/>
+                    <a:lstStyle/>
+                    <a:p>
+                      <a:r>
+                        <a:rPr lang="en-US" dirty="0" smtClean="0"/>
+                        <a:t>Analogous to </a:t>
+                      </a:r>
+                      <a:r>
+                        <a:rPr lang="en-US" dirty="0" err="1" smtClean="0"/>
+                        <a:t>IEnumerable</a:t>
+                      </a:r>
+                      <a:endParaRPr lang="en-US" dirty="0"/>
+                    </a:p>
+                  </a:txBody>
+                  <a:tcPr/>
+                </a:tc>
+                <a:extLst>
+                  <a:ext uri="{0D108BD9-81ED-4DB2-BD59-A6C34878D82A}">
+                    <a16:rowId xmlns:a16="http://schemas.microsoft.com/office/drawing/2014/main" val="2521457069"/>
+                  </a:ext>
+                </a:extLst>
+              </a:tr>
+              <a:tr h="640936">
+                <a:tc>
+                  <a:txBody>
+                    <a:bodyPr/>
+                    <a:lstStyle/>
+                    <a:p>
+                      <a:r>
+                        <a:rPr lang="en-US" dirty="0" err="1" smtClean="0"/>
+                        <a:t>.Net</a:t>
+                      </a:r>
+                      <a:r>
+                        <a:rPr lang="en-US" baseline="0" dirty="0" smtClean="0"/>
+                        <a:t> </a:t>
+                      </a:r>
+                      <a:r>
+                        <a:rPr lang="en-US" baseline="0" dirty="0" err="1" smtClean="0"/>
+                        <a:t>Devs</a:t>
+                      </a:r>
+                      <a:r>
+                        <a:rPr lang="en-US" baseline="0" dirty="0" smtClean="0"/>
+                        <a:t> interested in Data science (Exploration)</a:t>
+                      </a:r>
+                      <a:endParaRPr lang="en-US" dirty="0"/>
+                    </a:p>
+                  </a:txBody>
+                  <a:tcPr/>
+                </a:tc>
+                <a:tc>
+                  <a:txBody>
+                    <a:bodyPr/>
+                    <a:lstStyle/>
+                    <a:p>
+                      <a:r>
+                        <a:rPr lang="en-US" dirty="0" err="1" smtClean="0"/>
+                        <a:t>.Net</a:t>
+                      </a:r>
+                      <a:r>
+                        <a:rPr lang="en-US" dirty="0" smtClean="0"/>
+                        <a:t> </a:t>
+                      </a:r>
+                      <a:r>
+                        <a:rPr lang="en-US" dirty="0" err="1" smtClean="0"/>
+                        <a:t>Devs</a:t>
+                      </a:r>
+                      <a:r>
+                        <a:rPr lang="en-US" dirty="0" smtClean="0"/>
+                        <a:t> interested</a:t>
+                      </a:r>
+                      <a:r>
+                        <a:rPr lang="en-US" baseline="0" dirty="0" smtClean="0"/>
+                        <a:t> in ML (Prediction)</a:t>
+                      </a:r>
+                      <a:endParaRPr lang="en-US" dirty="0"/>
+                    </a:p>
+                  </a:txBody>
+                  <a:tcPr/>
+                </a:tc>
+                <a:extLst>
+                  <a:ext uri="{0D108BD9-81ED-4DB2-BD59-A6C34878D82A}">
+                    <a16:rowId xmlns:a16="http://schemas.microsoft.com/office/drawing/2014/main" val="603058531"/>
+                  </a:ext>
+                </a:extLst>
+              </a:tr>
+              <a:tr h="371336">
+                <a:tc>
+                  <a:txBody>
+                    <a:bodyPr/>
+                    <a:lstStyle/>
+                    <a:p>
+                      <a:r>
+                        <a:rPr lang="en-US" dirty="0" err="1" smtClean="0"/>
+                        <a:t>Schemaless</a:t>
+                      </a:r>
+                      <a:endParaRPr lang="en-US" dirty="0"/>
+                    </a:p>
+                  </a:txBody>
+                  <a:tcPr/>
+                </a:tc>
+                <a:tc>
+                  <a:txBody>
+                    <a:bodyPr/>
+                    <a:lstStyle/>
+                    <a:p>
+                      <a:r>
+                        <a:rPr lang="en-US" dirty="0" smtClean="0"/>
+                        <a:t>Schema bound</a:t>
+                      </a:r>
+                      <a:endParaRPr lang="en-US" dirty="0"/>
+                    </a:p>
+                  </a:txBody>
+                  <a:tcPr/>
+                </a:tc>
+                <a:extLst>
+                  <a:ext uri="{0D108BD9-81ED-4DB2-BD59-A6C34878D82A}">
+                    <a16:rowId xmlns:a16="http://schemas.microsoft.com/office/drawing/2014/main" val="3574950052"/>
+                  </a:ext>
+                </a:extLst>
+              </a:tr>
+              <a:tr h="371336">
+                <a:tc>
+                  <a:txBody>
+                    <a:bodyPr/>
+                    <a:lstStyle/>
+                    <a:p>
+                      <a:r>
+                        <a:rPr lang="en-US" dirty="0" smtClean="0"/>
+                        <a:t>Eager</a:t>
+                      </a:r>
+                      <a:r>
+                        <a:rPr lang="en-US" baseline="0" dirty="0" smtClean="0"/>
+                        <a:t>ly loaded</a:t>
+                      </a:r>
+                      <a:endParaRPr lang="en-US" dirty="0"/>
+                    </a:p>
+                  </a:txBody>
+                  <a:tcPr/>
+                </a:tc>
+                <a:tc>
+                  <a:txBody>
+                    <a:bodyPr/>
+                    <a:lstStyle/>
+                    <a:p>
+                      <a:r>
+                        <a:rPr lang="en-US" dirty="0" smtClean="0"/>
+                        <a:t>Lazy</a:t>
+                      </a:r>
+                      <a:r>
+                        <a:rPr lang="en-US" baseline="0" dirty="0" smtClean="0"/>
+                        <a:t> loaded</a:t>
+                      </a:r>
+                      <a:endParaRPr lang="en-US" dirty="0"/>
+                    </a:p>
+                  </a:txBody>
+                  <a:tcPr/>
+                </a:tc>
+                <a:extLst>
+                  <a:ext uri="{0D108BD9-81ED-4DB2-BD59-A6C34878D82A}">
+                    <a16:rowId xmlns:a16="http://schemas.microsoft.com/office/drawing/2014/main" val="54959668"/>
+                  </a:ext>
+                </a:extLst>
+              </a:tr>
+              <a:tr h="371336">
+                <a:tc>
+                  <a:txBody>
+                    <a:bodyPr/>
+                    <a:lstStyle/>
+                    <a:p>
+                      <a:r>
+                        <a:rPr lang="en-US" dirty="0" smtClean="0"/>
+                        <a:t>In-memory</a:t>
+                      </a:r>
+                      <a:endParaRPr lang="en-US" dirty="0"/>
+                    </a:p>
+                  </a:txBody>
+                  <a:tcPr/>
+                </a:tc>
+                <a:tc>
+                  <a:txBody>
+                    <a:bodyPr/>
+                    <a:lstStyle/>
+                    <a:p>
+                      <a:r>
+                        <a:rPr lang="en-US" dirty="0" smtClean="0"/>
+                        <a:t>Stream based, forward only cursor</a:t>
+                      </a:r>
+                      <a:endParaRPr lang="en-US" dirty="0"/>
+                    </a:p>
+                  </a:txBody>
+                  <a:tcPr/>
+                </a:tc>
+                <a:extLst>
+                  <a:ext uri="{0D108BD9-81ED-4DB2-BD59-A6C34878D82A}">
+                    <a16:rowId xmlns:a16="http://schemas.microsoft.com/office/drawing/2014/main" val="3909606772"/>
+                  </a:ext>
+                </a:extLst>
+              </a:tr>
+              <a:tr h="371336">
+                <a:tc>
+                  <a:txBody>
+                    <a:bodyPr/>
+                    <a:lstStyle/>
+                    <a:p>
+                      <a:r>
+                        <a:rPr lang="en-US" dirty="0" smtClean="0"/>
+                        <a:t>Random</a:t>
+                      </a:r>
+                      <a:r>
+                        <a:rPr lang="en-US" baseline="0" dirty="0" smtClean="0"/>
+                        <a:t> access</a:t>
+                      </a:r>
+                      <a:endParaRPr lang="en-US" dirty="0"/>
+                    </a:p>
+                  </a:txBody>
+                  <a:tcPr/>
+                </a:tc>
+                <a:tc>
+                  <a:txBody>
+                    <a:bodyPr/>
+                    <a:lstStyle/>
+                    <a:p>
+                      <a:r>
+                        <a:rPr lang="en-US" dirty="0" smtClean="0"/>
+                        <a:t>No random access</a:t>
+                      </a:r>
+                      <a:endParaRPr lang="en-US" dirty="0"/>
+                    </a:p>
+                  </a:txBody>
+                  <a:tcPr/>
+                </a:tc>
+                <a:extLst>
+                  <a:ext uri="{0D108BD9-81ED-4DB2-BD59-A6C34878D82A}">
+                    <a16:rowId xmlns:a16="http://schemas.microsoft.com/office/drawing/2014/main" val="717128011"/>
+                  </a:ext>
+                </a:extLst>
+              </a:tr>
+              <a:tr h="371336">
+                <a:tc>
+                  <a:txBody>
+                    <a:bodyPr/>
+                    <a:lstStyle/>
+                    <a:p>
+                      <a:r>
+                        <a:rPr lang="en-US" dirty="0" smtClean="0"/>
+                        <a:t>Easy to debug</a:t>
+                      </a:r>
+                      <a:endParaRPr lang="en-US" dirty="0"/>
+                    </a:p>
+                  </a:txBody>
+                  <a:tcPr/>
+                </a:tc>
+                <a:tc>
+                  <a:txBody>
+                    <a:bodyPr/>
+                    <a:lstStyle/>
+                    <a:p>
+                      <a:r>
+                        <a:rPr lang="en-US" dirty="0" smtClean="0"/>
+                        <a:t>Hard to debug</a:t>
+                      </a:r>
+                      <a:endParaRPr lang="en-US" dirty="0"/>
+                    </a:p>
+                  </a:txBody>
+                  <a:tcPr/>
+                </a:tc>
+                <a:extLst>
+                  <a:ext uri="{0D108BD9-81ED-4DB2-BD59-A6C34878D82A}">
+                    <a16:rowId xmlns:a16="http://schemas.microsoft.com/office/drawing/2014/main" val="277283504"/>
+                  </a:ext>
+                </a:extLst>
+              </a:tr>
+              <a:tr h="371336">
+                <a:tc>
+                  <a:txBody>
+                    <a:bodyPr/>
+                    <a:lstStyle/>
+                    <a:p>
+                      <a:r>
+                        <a:rPr lang="en-US" dirty="0" smtClean="0"/>
+                        <a:t>Support only Csv</a:t>
+                      </a:r>
+                      <a:endParaRPr lang="en-US" dirty="0"/>
+                    </a:p>
+                  </a:txBody>
+                  <a:tcPr/>
+                </a:tc>
+                <a:tc>
+                  <a:txBody>
+                    <a:bodyPr/>
+                    <a:lstStyle/>
+                    <a:p>
+                      <a:r>
+                        <a:rPr lang="en-US" dirty="0" smtClean="0"/>
+                        <a:t>Support</a:t>
+                      </a:r>
+                      <a:r>
+                        <a:rPr lang="en-US" baseline="0" dirty="0" smtClean="0"/>
+                        <a:t> Csv, </a:t>
+                      </a:r>
+                      <a:r>
+                        <a:rPr lang="en-US" baseline="0" dirty="0" err="1" smtClean="0"/>
+                        <a:t>IEnumerable</a:t>
+                      </a:r>
+                      <a:r>
+                        <a:rPr lang="en-US" baseline="0" dirty="0" smtClean="0"/>
+                        <a:t>, Relational DB </a:t>
+                      </a:r>
+                      <a:endParaRPr lang="en-US" dirty="0"/>
+                    </a:p>
+                  </a:txBody>
+                  <a:tcPr/>
+                </a:tc>
+                <a:extLst>
+                  <a:ext uri="{0D108BD9-81ED-4DB2-BD59-A6C34878D82A}">
+                    <a16:rowId xmlns:a16="http://schemas.microsoft.com/office/drawing/2014/main" val="4052602575"/>
+                  </a:ext>
+                </a:extLst>
+              </a:tr>
+              <a:tr h="371336">
+                <a:tc>
+                  <a:txBody>
+                    <a:bodyPr/>
+                    <a:lstStyle/>
+                    <a:p>
+                      <a:r>
+                        <a:rPr lang="en-US" dirty="0" smtClean="0"/>
+                        <a:t>Apache Arrow</a:t>
+                      </a:r>
+                      <a:r>
+                        <a:rPr lang="en-US" baseline="0" dirty="0" smtClean="0"/>
+                        <a:t> format</a:t>
+                      </a:r>
+                      <a:endParaRPr lang="en-US" dirty="0"/>
+                    </a:p>
+                  </a:txBody>
+                  <a:tcPr/>
+                </a:tc>
+                <a:tc>
+                  <a:txBody>
+                    <a:bodyPr/>
+                    <a:lstStyle/>
+                    <a:p>
+                      <a:r>
+                        <a:rPr lang="en-US" dirty="0" smtClean="0"/>
+                        <a:t>Schema</a:t>
+                      </a:r>
+                      <a:r>
+                        <a:rPr lang="en-US" baseline="0" dirty="0" smtClean="0"/>
+                        <a:t> based</a:t>
+                      </a:r>
+                      <a:endParaRPr lang="en-US" dirty="0"/>
+                    </a:p>
+                  </a:txBody>
+                  <a:tcPr/>
+                </a:tc>
+                <a:extLst>
+                  <a:ext uri="{0D108BD9-81ED-4DB2-BD59-A6C34878D82A}">
+                    <a16:rowId xmlns:a16="http://schemas.microsoft.com/office/drawing/2014/main" val="3354652797"/>
+                  </a:ext>
+                </a:extLst>
+              </a:tr>
+            </a:tbl>
+          </a:graphicData>
+        </a:graphic>
+      </p:graphicFrame>
     </p:spTree>
     <p:extLst>
       <p:ext uri="{BB962C8B-B14F-4D97-AF65-F5344CB8AC3E}">
-        <p14:creationId xmlns:p14="http://schemas.microsoft.com/office/powerpoint/2010/main" val="945527623"/>
+        <p14:creationId xmlns:p14="http://schemas.microsoft.com/office/powerpoint/2010/main" val="3982810098"/>
       </p:ext>
     </p:extLst>
   </p:cSld>
@@ -7181,6 +7534,229 @@
           <a:lstStyle/>
           <a:p>
             <a:r>
+              <a:rPr lang="en-US" dirty="0" err="1" smtClean="0"/>
+              <a:t>ML.Net</a:t>
+            </a:r>
+            <a:endParaRPr lang="en-US" dirty="0"/>
+          </a:p>
+        </p:txBody>
+      </p:sp>
+      <p:sp>
+        <p:nvSpPr>
+          <p:cNvPr id="6" name="Content Placeholder 2"/>
+          <p:cNvSpPr>
+            <a:spLocks noGrp="1"/>
+          </p:cNvSpPr>
+          <p:nvPr>
+            <p:ph idx="1"/>
+          </p:nvPr>
+        </p:nvSpPr>
+        <p:spPr>
+          <a:xfrm>
+            <a:off x="962295" y="2426208"/>
+            <a:ext cx="5853467" cy="2738846"/>
+          </a:xfrm>
+        </p:spPr>
+        <p:txBody>
+          <a:bodyPr>
+            <a:noAutofit/>
+          </a:bodyPr>
+          <a:lstStyle/>
+          <a:p>
+            <a:pPr marL="914400" lvl="1" indent="-457200" fontAlgn="base">
+              <a:lnSpc>
+                <a:spcPct val="150000"/>
+              </a:lnSpc>
+              <a:buFont typeface="Arial" panose="020B0604020202020204" pitchFamily="34" charset="0"/>
+              <a:buChar char="•"/>
+            </a:pPr>
+            <a:r>
+              <a:rPr lang="en-US" sz="2800" dirty="0" smtClean="0"/>
+              <a:t>Time Series</a:t>
+            </a:r>
+          </a:p>
+          <a:p>
+            <a:pPr marL="914400" lvl="1" indent="-457200" fontAlgn="base">
+              <a:lnSpc>
+                <a:spcPct val="150000"/>
+              </a:lnSpc>
+              <a:buFont typeface="Arial" panose="020B0604020202020204" pitchFamily="34" charset="0"/>
+              <a:buChar char="•"/>
+            </a:pPr>
+            <a:r>
+              <a:rPr lang="en-US" sz="2800" dirty="0" smtClean="0"/>
+              <a:t>Load Data – </a:t>
+            </a:r>
+            <a:r>
+              <a:rPr lang="en-US" sz="2800" dirty="0" err="1" smtClean="0"/>
+              <a:t>MLContext</a:t>
+            </a:r>
+            <a:endParaRPr lang="en-US" sz="2800" dirty="0" smtClean="0"/>
+          </a:p>
+          <a:p>
+            <a:pPr marL="914400" lvl="1" indent="-457200" fontAlgn="base">
+              <a:lnSpc>
+                <a:spcPct val="150000"/>
+              </a:lnSpc>
+              <a:buFont typeface="Arial" panose="020B0604020202020204" pitchFamily="34" charset="0"/>
+              <a:buChar char="•"/>
+            </a:pPr>
+            <a:r>
+              <a:rPr lang="en-US" sz="2800" dirty="0" smtClean="0"/>
+              <a:t>ML Pipeline</a:t>
+            </a:r>
+          </a:p>
+          <a:p>
+            <a:pPr marL="914400" lvl="1" indent="-457200" fontAlgn="base">
+              <a:lnSpc>
+                <a:spcPct val="150000"/>
+              </a:lnSpc>
+              <a:buFont typeface="Arial" panose="020B0604020202020204" pitchFamily="34" charset="0"/>
+              <a:buChar char="•"/>
+            </a:pPr>
+            <a:r>
+              <a:rPr lang="en-US" sz="2800" dirty="0"/>
+              <a:t>Predicting </a:t>
+            </a:r>
+            <a:r>
+              <a:rPr lang="en-US" sz="2800" dirty="0" smtClean="0"/>
+              <a:t>confirmed cases</a:t>
+            </a:r>
+            <a:r>
+              <a:rPr lang="en-US" sz="2800" dirty="0" smtClean="0"/>
+              <a:t> </a:t>
+            </a:r>
+            <a:r>
+              <a:rPr lang="en-US" sz="2800" dirty="0"/>
+              <a:t>in next 7 </a:t>
+            </a:r>
+            <a:r>
+              <a:rPr lang="en-US" sz="2800" dirty="0" smtClean="0"/>
+              <a:t>days</a:t>
+            </a:r>
+            <a:endParaRPr lang="en-US" sz="2800" dirty="0"/>
+          </a:p>
+        </p:txBody>
+      </p:sp>
+      <p:sp>
+        <p:nvSpPr>
+          <p:cNvPr id="7" name="Content Placeholder 2"/>
+          <p:cNvSpPr>
+            <a:spLocks noGrp="1"/>
+          </p:cNvSpPr>
+          <p:nvPr>
+            <p:ph idx="1"/>
+          </p:nvPr>
+        </p:nvSpPr>
+        <p:spPr>
+          <a:xfrm>
+            <a:off x="5934456" y="1941576"/>
+            <a:ext cx="6144769" cy="1734312"/>
+          </a:xfrm>
+        </p:spPr>
+        <p:txBody>
+          <a:bodyPr>
+            <a:noAutofit/>
+          </a:bodyPr>
+          <a:lstStyle/>
+          <a:p>
+            <a:pPr marL="914400" lvl="1" indent="-457200" fontAlgn="base">
+              <a:lnSpc>
+                <a:spcPct val="150000"/>
+              </a:lnSpc>
+              <a:buFont typeface="Arial" panose="020B0604020202020204" pitchFamily="34" charset="0"/>
+              <a:buChar char="•"/>
+            </a:pPr>
+            <a:r>
+              <a:rPr lang="en-US" sz="2800" dirty="0" smtClean="0">
+                <a:hlinkClick r:id="rId3"/>
+              </a:rPr>
+              <a:t>Single </a:t>
+            </a:r>
+            <a:r>
+              <a:rPr lang="en-US" sz="2800" dirty="0">
+                <a:hlinkClick r:id="rId3"/>
+              </a:rPr>
+              <a:t>Spectrum Analysis</a:t>
+            </a:r>
+            <a:endParaRPr lang="en-US" sz="2800" dirty="0"/>
+          </a:p>
+          <a:p>
+            <a:pPr marL="914400" lvl="1" indent="-457200" fontAlgn="base">
+              <a:lnSpc>
+                <a:spcPct val="150000"/>
+              </a:lnSpc>
+              <a:buFont typeface="Arial" panose="020B0604020202020204" pitchFamily="34" charset="0"/>
+              <a:buChar char="•"/>
+            </a:pPr>
+            <a:r>
+              <a:rPr lang="en-US" sz="2800" dirty="0" err="1">
+                <a:hlinkClick r:id="rId4"/>
+              </a:rPr>
+              <a:t>TimeSeriesCatalog.ForecastBySsa</a:t>
+            </a:r>
+            <a:endParaRPr lang="en-US" sz="2800" dirty="0"/>
+          </a:p>
+        </p:txBody>
+      </p:sp>
+    </p:spTree>
+    <p:extLst>
+      <p:ext uri="{BB962C8B-B14F-4D97-AF65-F5344CB8AC3E}">
+        <p14:creationId xmlns:p14="http://schemas.microsoft.com/office/powerpoint/2010/main" val="945527623"/>
+      </p:ext>
+    </p:extLst>
+  </p:cSld>
+  <p:clrMapOvr>
+    <a:masterClrMapping/>
+  </p:clrMapOvr>
+  <p:timing>
+    <p:tnLst>
+      <p:par>
+        <p:cTn id="1" dur="indefinite" restart="never" nodeType="tmRoot"/>
+      </p:par>
+    </p:tnLst>
+  </p:timing>
+</p:sld>
+</file>
+
+<file path=ppt/slides/slide13.xml><?xml version="1.0" encoding="utf-8"?>
+<p:sld xmlns:a="http://schemas.openxmlformats.org/drawingml/2006/main" xmlns:r="http://schemas.openxmlformats.org/officeDocument/2006/relationships" xmlns:p="http://schemas.openxmlformats.org/presentationml/2006/main">
+  <p:cSld>
+    <p:spTree>
+      <p:nvGrpSpPr>
+        <p:cNvPr id="1" name=""/>
+        <p:cNvGrpSpPr/>
+        <p:nvPr/>
+      </p:nvGrpSpPr>
+      <p:grpSpPr>
+        <a:xfrm>
+          <a:off x="0" y="0"/>
+          <a:ext cx="0" cy="0"/>
+          <a:chOff x="0" y="0"/>
+          <a:chExt cx="0" cy="0"/>
+        </a:xfrm>
+      </p:grpSpPr>
+      <p:sp>
+        <p:nvSpPr>
+          <p:cNvPr id="2" name="Title 1"/>
+          <p:cNvSpPr>
+            <a:spLocks noGrp="1"/>
+          </p:cNvSpPr>
+          <p:nvPr>
+            <p:ph type="title"/>
+          </p:nvPr>
+        </p:nvSpPr>
+        <p:spPr>
+          <a:xfrm>
+            <a:off x="1141411" y="619127"/>
+            <a:ext cx="9906000" cy="834536"/>
+          </a:xfrm>
+        </p:spPr>
+        <p:txBody>
+          <a:bodyPr/>
+          <a:lstStyle/>
+          <a:p>
+            <a:r>
               <a:rPr lang="en-US" dirty="0" smtClean="0"/>
               <a:t>Visualization</a:t>
             </a:r>
@@ -7302,7 +7878,7 @@
 </p:sld>
 </file>
 
-<file path=ppt/slides/slide13.xml><?xml version="1.0" encoding="utf-8"?>
+<file path=ppt/slides/slide14.xml><?xml version="1.0" encoding="utf-8"?>
 <p:sld xmlns:a="http://schemas.openxmlformats.org/drawingml/2006/main" xmlns:r="http://schemas.openxmlformats.org/officeDocument/2006/relationships" xmlns:p="http://schemas.openxmlformats.org/presentationml/2006/main">
   <p:cSld>
     <p:spTree>
@@ -7414,7 +7990,7 @@
 </p:sld>
 </file>
 
-<file path=ppt/slides/slide14.xml><?xml version="1.0" encoding="utf-8"?>
+<file path=ppt/slides/slide15.xml><?xml version="1.0" encoding="utf-8"?>
 <p:sld xmlns:a="http://schemas.openxmlformats.org/drawingml/2006/main" xmlns:r="http://schemas.openxmlformats.org/officeDocument/2006/relationships" xmlns:p="http://schemas.openxmlformats.org/presentationml/2006/main">
   <p:cSld>
     <p:spTree>
@@ -7846,7 +8422,7 @@
 </p:sld>
 </file>
 
-<file path=ppt/slides/slide15.xml><?xml version="1.0" encoding="utf-8"?>
+<file path=ppt/slides/slide16.xml><?xml version="1.0" encoding="utf-8"?>
 <p:sld xmlns:a="http://schemas.openxmlformats.org/drawingml/2006/main" xmlns:r="http://schemas.openxmlformats.org/officeDocument/2006/relationships" xmlns:p="http://schemas.openxmlformats.org/presentationml/2006/main">
   <p:cSld>
     <p:spTree>
@@ -7914,7 +8490,7 @@
 </p:sld>
 </file>
 
-<file path=ppt/slides/slide16.xml><?xml version="1.0" encoding="utf-8"?>
+<file path=ppt/slides/slide17.xml><?xml version="1.0" encoding="utf-8"?>
 <p:sld xmlns:a="http://schemas.openxmlformats.org/drawingml/2006/main" xmlns:r="http://schemas.openxmlformats.org/officeDocument/2006/relationships" xmlns:p="http://schemas.openxmlformats.org/presentationml/2006/main">
   <p:cSld>
     <p:spTree>
@@ -8034,7 +8610,7 @@
 </p:sld>
 </file>
 
-<file path=ppt/slides/slide17.xml><?xml version="1.0" encoding="utf-8"?>
+<file path=ppt/slides/slide18.xml><?xml version="1.0" encoding="utf-8"?>
 <p:sld xmlns:a="http://schemas.openxmlformats.org/drawingml/2006/main" xmlns:r="http://schemas.openxmlformats.org/officeDocument/2006/relationships" xmlns:p="http://schemas.openxmlformats.org/presentationml/2006/main">
   <p:cSld>
     <p:spTree>
@@ -8393,19 +8969,7 @@
                 </a:solidFill>
                 <a:hlinkClick r:id="rId9"/>
               </a:rPr>
-              <a:t>https</a:t>
-            </a:r>
-            <a:r>
-              <a:rPr lang="en-US" sz="2600" dirty="0">
-                <a:solidFill>
-                  <a:schemeClr val="tx1">
-                    <a:lumMod val="75000"/>
-                    <a:lumOff val="25000"/>
-                  </a:schemeClr>
-                </a:solidFill>
-                <a:hlinkClick r:id="rId9"/>
-              </a:rPr>
-              <a:t>://t.me/joinchat/IifUJQ_PuYT757Turx-nLg </a:t>
+              <a:t>https://t.me/joinchat/IifUJQ_PuYT757Turx-nLg </a:t>
             </a:r>
             <a:endParaRPr lang="en-US" sz="2600" dirty="0">
               <a:solidFill>
@@ -11845,7 +12409,7 @@
         </p:blipFill>
         <p:spPr>
           <a:xfrm>
-            <a:off x="6583680" y="1944687"/>
+            <a:off x="6592389" y="1944687"/>
             <a:ext cx="5471934" cy="4229690"/>
           </a:xfrm>
           <a:prstGeom prst="rect">

</xml_diff>

<commit_message>
Added Improvement to PPT
</commit_message>
<xml_diff>
--- a/31052020-virtualmlnet/virtualmlnet-2020.pptx
+++ b/31052020-virtualmlnet/virtualmlnet-2020.pptx
@@ -5,7 +5,7 @@
     <p:sldMasterId id="2147483717" r:id="rId1"/>
   </p:sldMasterIdLst>
   <p:notesMasterIdLst>
-    <p:notesMasterId r:id="rId20"/>
+    <p:notesMasterId r:id="rId21"/>
   </p:notesMasterIdLst>
   <p:sldIdLst>
     <p:sldId id="256" r:id="rId2"/>
@@ -23,9 +23,10 @@
     <p:sldId id="320" r:id="rId14"/>
     <p:sldId id="326" r:id="rId15"/>
     <p:sldId id="327" r:id="rId16"/>
-    <p:sldId id="321" r:id="rId17"/>
-    <p:sldId id="324" r:id="rId18"/>
-    <p:sldId id="325" r:id="rId19"/>
+    <p:sldId id="329" r:id="rId17"/>
+    <p:sldId id="321" r:id="rId18"/>
+    <p:sldId id="324" r:id="rId19"/>
+    <p:sldId id="325" r:id="rId20"/>
   </p:sldIdLst>
   <p:sldSz cx="12192000" cy="6858000"/>
   <p:notesSz cx="6858000" cy="9144000"/>
@@ -1076,7 +1077,7 @@
     </p:spTree>
     <p:extLst>
       <p:ext uri="{BB962C8B-B14F-4D97-AF65-F5344CB8AC3E}">
-        <p14:creationId xmlns:p14="http://schemas.microsoft.com/office/powerpoint/2010/main" val="2773224715"/>
+        <p14:creationId xmlns:p14="http://schemas.microsoft.com/office/powerpoint/2010/main" val="1684855623"/>
       </p:ext>
     </p:extLst>
   </p:cSld>
@@ -1160,7 +1161,7 @@
     </p:spTree>
     <p:extLst>
       <p:ext uri="{BB962C8B-B14F-4D97-AF65-F5344CB8AC3E}">
-        <p14:creationId xmlns:p14="http://schemas.microsoft.com/office/powerpoint/2010/main" val="1766728910"/>
+        <p14:creationId xmlns:p14="http://schemas.microsoft.com/office/powerpoint/2010/main" val="2773224715"/>
       </p:ext>
     </p:extLst>
   </p:cSld>
@@ -1236,6 +1237,90 @@
             <a:fld id="{55849CEA-452E-49F3-92ED-210B64DD3C6C}" type="slidenum">
               <a:rPr lang="en-US" smtClean="0"/>
               <a:t>18</a:t>
+            </a:fld>
+            <a:endParaRPr lang="en-US" dirty="0"/>
+          </a:p>
+        </p:txBody>
+      </p:sp>
+    </p:spTree>
+    <p:extLst>
+      <p:ext uri="{BB962C8B-B14F-4D97-AF65-F5344CB8AC3E}">
+        <p14:creationId xmlns:p14="http://schemas.microsoft.com/office/powerpoint/2010/main" val="1766728910"/>
+      </p:ext>
+    </p:extLst>
+  </p:cSld>
+  <p:clrMapOvr>
+    <a:masterClrMapping/>
+  </p:clrMapOvr>
+</p:notes>
+</file>
+
+<file path=ppt/notesSlides/notesSlide18.xml><?xml version="1.0" encoding="utf-8"?>
+<p:notes xmlns:a="http://schemas.openxmlformats.org/drawingml/2006/main" xmlns:r="http://schemas.openxmlformats.org/officeDocument/2006/relationships" xmlns:p="http://schemas.openxmlformats.org/presentationml/2006/main">
+  <p:cSld>
+    <p:spTree>
+      <p:nvGrpSpPr>
+        <p:cNvPr id="1" name=""/>
+        <p:cNvGrpSpPr/>
+        <p:nvPr/>
+      </p:nvGrpSpPr>
+      <p:grpSpPr>
+        <a:xfrm>
+          <a:off x="0" y="0"/>
+          <a:ext cx="0" cy="0"/>
+          <a:chOff x="0" y="0"/>
+          <a:chExt cx="0" cy="0"/>
+        </a:xfrm>
+      </p:grpSpPr>
+      <p:sp>
+        <p:nvSpPr>
+          <p:cNvPr id="2" name="Slide Image Placeholder 1"/>
+          <p:cNvSpPr>
+            <a:spLocks noGrp="1" noRot="1" noChangeAspect="1"/>
+          </p:cNvSpPr>
+          <p:nvPr>
+            <p:ph type="sldImg"/>
+          </p:nvPr>
+        </p:nvSpPr>
+        <p:spPr/>
+      </p:sp>
+      <p:sp>
+        <p:nvSpPr>
+          <p:cNvPr id="3" name="Notes Placeholder 2"/>
+          <p:cNvSpPr>
+            <a:spLocks noGrp="1"/>
+          </p:cNvSpPr>
+          <p:nvPr>
+            <p:ph type="body" idx="1"/>
+          </p:nvPr>
+        </p:nvSpPr>
+        <p:spPr/>
+        <p:txBody>
+          <a:bodyPr/>
+          <a:lstStyle/>
+          <a:p>
+            <a:endParaRPr lang="en-US" dirty="0"/>
+          </a:p>
+        </p:txBody>
+      </p:sp>
+      <p:sp>
+        <p:nvSpPr>
+          <p:cNvPr id="4" name="Slide Number Placeholder 3"/>
+          <p:cNvSpPr>
+            <a:spLocks noGrp="1"/>
+          </p:cNvSpPr>
+          <p:nvPr>
+            <p:ph type="sldNum" sz="quarter" idx="10"/>
+          </p:nvPr>
+        </p:nvSpPr>
+        <p:spPr/>
+        <p:txBody>
+          <a:bodyPr/>
+          <a:lstStyle/>
+          <a:p>
+            <a:fld id="{55849CEA-452E-49F3-92ED-210B64DD3C6C}" type="slidenum">
+              <a:rPr lang="en-US" smtClean="0"/>
+              <a:t>19</a:t>
             </a:fld>
             <a:endParaRPr lang="en-US" dirty="0"/>
           </a:p>
@@ -6967,11 +7052,7 @@
             </a:r>
             <a:r>
               <a:rPr lang="en-US" dirty="0" smtClean="0"/>
-              <a:t> </a:t>
-            </a:r>
-            <a:r>
-              <a:rPr lang="en-US" dirty="0" smtClean="0"/>
-              <a:t>Vs </a:t>
+              <a:t> Vs </a:t>
             </a:r>
             <a:r>
               <a:rPr lang="en-US" dirty="0" err="1" smtClean="0"/>
@@ -7620,11 +7701,7 @@
             </a:r>
             <a:r>
               <a:rPr lang="en-US" sz="2800" dirty="0" smtClean="0"/>
-              <a:t>confirmed cases</a:t>
-            </a:r>
-            <a:r>
-              <a:rPr lang="en-US" sz="2800" dirty="0" smtClean="0"/>
-              <a:t> </a:t>
+              <a:t>confirmed cases </a:t>
             </a:r>
             <a:r>
               <a:rPr lang="en-US" sz="2800" dirty="0"/>
@@ -8441,39 +8518,105 @@
       </p:grpSpPr>
       <p:sp>
         <p:nvSpPr>
-          <p:cNvPr id="7" name="TextBox 6"/>
-          <p:cNvSpPr txBox="1"/>
-          <p:nvPr/>
+          <p:cNvPr id="2" name="Title 1"/>
+          <p:cNvSpPr>
+            <a:spLocks noGrp="1"/>
+          </p:cNvSpPr>
+          <p:nvPr>
+            <p:ph type="title"/>
+          </p:nvPr>
         </p:nvSpPr>
         <p:spPr>
           <a:xfrm>
-            <a:off x="2421747" y="2855822"/>
-            <a:ext cx="6574870" cy="830997"/>
+            <a:off x="1141411" y="619127"/>
+            <a:ext cx="9906000" cy="834536"/>
           </a:xfrm>
-          <a:prstGeom prst="rect">
-            <a:avLst/>
-          </a:prstGeom>
-          <a:noFill/>
         </p:spPr>
         <p:txBody>
-          <a:bodyPr wrap="square" rtlCol="0">
-            <a:spAutoFit/>
+          <a:bodyPr/>
+          <a:lstStyle/>
+          <a:p>
+            <a:r>
+              <a:rPr lang="en-US" dirty="0" smtClean="0"/>
+              <a:t>Improvements</a:t>
+            </a:r>
+            <a:endParaRPr lang="en-US" dirty="0"/>
+          </a:p>
+        </p:txBody>
+      </p:sp>
+      <p:sp>
+        <p:nvSpPr>
+          <p:cNvPr id="6" name="Content Placeholder 2"/>
+          <p:cNvSpPr>
+            <a:spLocks noGrp="1"/>
+          </p:cNvSpPr>
+          <p:nvPr>
+            <p:ph idx="1"/>
+          </p:nvPr>
+        </p:nvSpPr>
+        <p:spPr>
+          <a:xfrm>
+            <a:off x="940524" y="2154065"/>
+            <a:ext cx="9564189" cy="2738846"/>
+          </a:xfrm>
+        </p:spPr>
+        <p:txBody>
+          <a:bodyPr>
+            <a:noAutofit/>
           </a:bodyPr>
           <a:lstStyle/>
           <a:p>
-            <a:pPr algn="ctr"/>
-            <a:r>
-              <a:rPr lang="en-US" sz="4800" b="1" dirty="0" smtClean="0"/>
-              <a:t>Demo</a:t>
-            </a:r>
-            <a:endParaRPr lang="en-US" sz="4800" b="1" dirty="0"/>
+            <a:pPr marL="914400" lvl="1" indent="-457200" fontAlgn="base">
+              <a:lnSpc>
+                <a:spcPct val="150000"/>
+              </a:lnSpc>
+              <a:buFont typeface="Arial" panose="020B0604020202020204" pitchFamily="34" charset="0"/>
+              <a:buChar char="•"/>
+            </a:pPr>
+            <a:r>
+              <a:rPr lang="en-US" sz="2800" dirty="0" smtClean="0"/>
+              <a:t>Support for separator and quotes in a column</a:t>
+            </a:r>
+            <a:endParaRPr lang="en-US" sz="2800" dirty="0" smtClean="0"/>
+          </a:p>
+          <a:p>
+            <a:pPr marL="914400" lvl="1" indent="-457200" fontAlgn="base">
+              <a:lnSpc>
+                <a:spcPct val="150000"/>
+              </a:lnSpc>
+              <a:buFont typeface="Arial" panose="020B0604020202020204" pitchFamily="34" charset="0"/>
+              <a:buChar char="•"/>
+            </a:pPr>
+            <a:r>
+              <a:rPr lang="en-US" sz="2800" dirty="0" smtClean="0"/>
+              <a:t>Transpose data from rows to columns and vice versa</a:t>
+            </a:r>
+            <a:endParaRPr lang="en-US" sz="2800" dirty="0" smtClean="0"/>
+          </a:p>
+          <a:p>
+            <a:pPr marL="914400" lvl="1" indent="-457200" fontAlgn="base">
+              <a:lnSpc>
+                <a:spcPct val="150000"/>
+              </a:lnSpc>
+              <a:buFont typeface="Arial" panose="020B0604020202020204" pitchFamily="34" charset="0"/>
+              <a:buChar char="•"/>
+            </a:pPr>
+            <a:r>
+              <a:rPr lang="en-US" sz="2800" dirty="0" err="1" smtClean="0"/>
+              <a:t>DataTime</a:t>
+            </a:r>
+            <a:r>
+              <a:rPr lang="en-US" sz="2800" dirty="0" smtClean="0"/>
+              <a:t> Column datatype</a:t>
+            </a:r>
+            <a:endParaRPr lang="en-US" sz="2800" dirty="0" smtClean="0"/>
           </a:p>
         </p:txBody>
       </p:sp>
     </p:spTree>
     <p:extLst>
       <p:ext uri="{BB962C8B-B14F-4D97-AF65-F5344CB8AC3E}">
-        <p14:creationId xmlns:p14="http://schemas.microsoft.com/office/powerpoint/2010/main" val="427025909"/>
+        <p14:creationId xmlns:p14="http://schemas.microsoft.com/office/powerpoint/2010/main" val="3871987218"/>
       </p:ext>
     </p:extLst>
   </p:cSld>
@@ -8509,6 +8652,74 @@
       </p:grpSpPr>
       <p:sp>
         <p:nvSpPr>
+          <p:cNvPr id="7" name="TextBox 6"/>
+          <p:cNvSpPr txBox="1"/>
+          <p:nvPr/>
+        </p:nvSpPr>
+        <p:spPr>
+          <a:xfrm>
+            <a:off x="2421747" y="2855822"/>
+            <a:ext cx="6574870" cy="830997"/>
+          </a:xfrm>
+          <a:prstGeom prst="rect">
+            <a:avLst/>
+          </a:prstGeom>
+          <a:noFill/>
+        </p:spPr>
+        <p:txBody>
+          <a:bodyPr wrap="square" rtlCol="0">
+            <a:spAutoFit/>
+          </a:bodyPr>
+          <a:lstStyle/>
+          <a:p>
+            <a:pPr algn="ctr"/>
+            <a:r>
+              <a:rPr lang="en-US" sz="4800" b="1" dirty="0" smtClean="0"/>
+              <a:t>Demo</a:t>
+            </a:r>
+            <a:endParaRPr lang="en-US" sz="4800" b="1" dirty="0"/>
+          </a:p>
+        </p:txBody>
+      </p:sp>
+    </p:spTree>
+    <p:extLst>
+      <p:ext uri="{BB962C8B-B14F-4D97-AF65-F5344CB8AC3E}">
+        <p14:creationId xmlns:p14="http://schemas.microsoft.com/office/powerpoint/2010/main" val="427025909"/>
+      </p:ext>
+    </p:extLst>
+  </p:cSld>
+  <p:clrMapOvr>
+    <a:masterClrMapping/>
+  </p:clrMapOvr>
+  <p:timing>
+    <p:tnLst>
+      <p:par>
+        <p:cTn id="1" dur="indefinite" restart="never" nodeType="tmRoot"/>
+      </p:par>
+    </p:tnLst>
+  </p:timing>
+</p:sld>
+</file>
+
+<file path=ppt/slides/slide18.xml><?xml version="1.0" encoding="utf-8"?>
+<p:sld xmlns:a="http://schemas.openxmlformats.org/drawingml/2006/main" xmlns:r="http://schemas.openxmlformats.org/officeDocument/2006/relationships" xmlns:p="http://schemas.openxmlformats.org/presentationml/2006/main">
+  <p:cSld>
+    <p:spTree>
+      <p:nvGrpSpPr>
+        <p:cNvPr id="1" name=""/>
+        <p:cNvGrpSpPr/>
+        <p:nvPr/>
+      </p:nvGrpSpPr>
+      <p:grpSpPr>
+        <a:xfrm>
+          <a:off x="0" y="0"/>
+          <a:ext cx="0" cy="0"/>
+          <a:chOff x="0" y="0"/>
+          <a:chExt cx="0" cy="0"/>
+        </a:xfrm>
+      </p:grpSpPr>
+      <p:sp>
+        <p:nvSpPr>
           <p:cNvPr id="2" name="Title 1"/>
           <p:cNvSpPr>
             <a:spLocks noGrp="1"/>
@@ -8610,7 +8821,7 @@
 </p:sld>
 </file>
 
-<file path=ppt/slides/slide18.xml><?xml version="1.0" encoding="utf-8"?>
+<file path=ppt/slides/slide19.xml><?xml version="1.0" encoding="utf-8"?>
 <p:sld xmlns:a="http://schemas.openxmlformats.org/drawingml/2006/main" xmlns:r="http://schemas.openxmlformats.org/officeDocument/2006/relationships" xmlns:p="http://schemas.openxmlformats.org/presentationml/2006/main">
   <p:cSld>
     <p:spTree>

</xml_diff>

<commit_message>
Updated reference to new github
</commit_message>
<xml_diff>
--- a/31052020-virtualmlnet/virtualmlnet-2020.pptx
+++ b/31052020-virtualmlnet/virtualmlnet-2020.pptx
@@ -215,7 +215,7 @@
           <a:p>
             <a:fld id="{154FEC57-6F76-4D9A-BEBF-4431325DB260}" type="datetimeFigureOut">
               <a:rPr lang="en-US" smtClean="0"/>
-              <a:t>5/30/2020</a:t>
+              <a:t>7/6/2020</a:t>
             </a:fld>
             <a:endParaRPr lang="en-US" dirty="0"/>
           </a:p>
@@ -2252,7 +2252,7 @@
           <a:p>
             <a:fld id="{48A87A34-81AB-432B-8DAE-1953F412C126}" type="datetimeFigureOut">
               <a:rPr lang="en-US" smtClean="0"/>
-              <a:t>5/30/2020</a:t>
+              <a:t>7/6/2020</a:t>
             </a:fld>
             <a:endParaRPr lang="en-US" dirty="0"/>
           </a:p>
@@ -2460,7 +2460,7 @@
           <a:p>
             <a:fld id="{48A87A34-81AB-432B-8DAE-1953F412C126}" type="datetimeFigureOut">
               <a:rPr lang="en-US" smtClean="0"/>
-              <a:t>5/30/2020</a:t>
+              <a:t>7/6/2020</a:t>
             </a:fld>
             <a:endParaRPr lang="en-US" dirty="0"/>
           </a:p>
@@ -2718,7 +2718,7 @@
           <a:p>
             <a:fld id="{48A87A34-81AB-432B-8DAE-1953F412C126}" type="datetimeFigureOut">
               <a:rPr lang="en-US" smtClean="0"/>
-              <a:t>5/30/2020</a:t>
+              <a:t>7/6/2020</a:t>
             </a:fld>
             <a:endParaRPr lang="en-US" dirty="0"/>
           </a:p>
@@ -2888,7 +2888,7 @@
           <a:p>
             <a:fld id="{48A87A34-81AB-432B-8DAE-1953F412C126}" type="datetimeFigureOut">
               <a:rPr lang="en-US" smtClean="0"/>
-              <a:t>5/30/2020</a:t>
+              <a:t>7/6/2020</a:t>
             </a:fld>
             <a:endParaRPr lang="en-US" dirty="0"/>
           </a:p>
@@ -3225,7 +3225,7 @@
           <a:p>
             <a:fld id="{48A87A34-81AB-432B-8DAE-1953F412C126}" type="datetimeFigureOut">
               <a:rPr lang="en-US" smtClean="0"/>
-              <a:t>5/30/2020</a:t>
+              <a:t>7/6/2020</a:t>
             </a:fld>
             <a:endParaRPr lang="en-US" dirty="0"/>
           </a:p>
@@ -3500,7 +3500,7 @@
           <a:p>
             <a:fld id="{48A87A34-81AB-432B-8DAE-1953F412C126}" type="datetimeFigureOut">
               <a:rPr lang="en-US" smtClean="0"/>
-              <a:t>5/30/2020</a:t>
+              <a:t>7/6/2020</a:t>
             </a:fld>
             <a:endParaRPr lang="en-US" dirty="0"/>
           </a:p>
@@ -3879,7 +3879,7 @@
           <a:p>
             <a:fld id="{48A87A34-81AB-432B-8DAE-1953F412C126}" type="datetimeFigureOut">
               <a:rPr lang="en-US" smtClean="0"/>
-              <a:t>5/30/2020</a:t>
+              <a:t>7/6/2020</a:t>
             </a:fld>
             <a:endParaRPr lang="en-US" dirty="0"/>
           </a:p>
@@ -3997,7 +3997,7 @@
           <a:p>
             <a:fld id="{48A87A34-81AB-432B-8DAE-1953F412C126}" type="datetimeFigureOut">
               <a:rPr lang="en-US" smtClean="0"/>
-              <a:t>5/30/2020</a:t>
+              <a:t>7/6/2020</a:t>
             </a:fld>
             <a:endParaRPr lang="en-US" dirty="0"/>
           </a:p>
@@ -4170,7 +4170,7 @@
           <a:p>
             <a:fld id="{48A87A34-81AB-432B-8DAE-1953F412C126}" type="datetimeFigureOut">
               <a:rPr lang="en-US" smtClean="0"/>
-              <a:t>5/30/2020</a:t>
+              <a:t>7/6/2020</a:t>
             </a:fld>
             <a:endParaRPr lang="en-US" dirty="0"/>
           </a:p>
@@ -4526,7 +4526,7 @@
           <a:p>
             <a:fld id="{48A87A34-81AB-432B-8DAE-1953F412C126}" type="datetimeFigureOut">
               <a:rPr lang="en-US" smtClean="0"/>
-              <a:t>5/30/2020</a:t>
+              <a:t>7/6/2020</a:t>
             </a:fld>
             <a:endParaRPr lang="en-US" dirty="0"/>
           </a:p>
@@ -4905,7 +4905,7 @@
           <a:p>
             <a:fld id="{48A87A34-81AB-432B-8DAE-1953F412C126}" type="datetimeFigureOut">
               <a:rPr lang="en-US" smtClean="0"/>
-              <a:t>5/30/2020</a:t>
+              <a:t>7/6/2020</a:t>
             </a:fld>
             <a:endParaRPr lang="en-US" dirty="0"/>
           </a:p>
@@ -5195,7 +5195,7 @@
             <a:fld id="{48A87A34-81AB-432B-8DAE-1953F412C126}" type="datetimeFigureOut">
               <a:rPr lang="en-US" smtClean="0"/>
               <a:pPr/>
-              <a:t>5/30/2020</a:t>
+              <a:t>7/6/2020</a:t>
             </a:fld>
             <a:endParaRPr lang="en-US" dirty="0"/>
           </a:p>
@@ -8987,7 +8987,13 @@
               <a:rPr lang="en-US" sz="2800" dirty="0">
                 <a:hlinkClick r:id="rId4"/>
               </a:rPr>
-              <a:t>https://github.com/praveenraghuvanshi1512/TechnicalSessions/tree/master/31052020-virtualmlnet</a:t>
+              <a:t>https://</a:t>
+            </a:r>
+            <a:r>
+              <a:rPr lang="en-US" sz="2800" dirty="0" smtClean="0">
+                <a:hlinkClick r:id="rId4"/>
+              </a:rPr>
+              <a:t>github.com/praveenraghuvanshi/TechnicalSessions/tree/master/31052020-virtualmlnet</a:t>
             </a:r>
             <a:endParaRPr lang="en-US" sz="2800" dirty="0"/>
           </a:p>
@@ -9152,17 +9158,20 @@
               <a:t>https</a:t>
             </a:r>
             <a:r>
-              <a:rPr lang="en-US" sz="8000" dirty="0">
+              <a:rPr lang="en-US" sz="8000">
                 <a:hlinkClick r:id="rId4"/>
               </a:rPr>
               <a:t>://</a:t>
             </a:r>
             <a:r>
-              <a:rPr lang="en-US" sz="8000" dirty="0" smtClean="0">
+              <a:rPr lang="en-US" sz="8000" smtClean="0">
                 <a:hlinkClick r:id="rId4"/>
               </a:rPr>
-              <a:t>github.com/praveenraghuvanshi1512</a:t>
-            </a:r>
+              <a:t>github.com/praveenraghuvanshi</a:t>
+            </a:r>
+            <a:endParaRPr lang="en-US" sz="8000" dirty="0" smtClean="0">
+              <a:hlinkClick r:id="rId4"/>
+            </a:endParaRPr>
           </a:p>
           <a:p>
             <a:pPr marL="0" indent="0">

</xml_diff>